<commit_message>
Added lecture materials from today.
</commit_message>
<xml_diff>
--- a/lectures/L6_Aspen.pptx
+++ b/lectures/L6_Aspen.pptx
@@ -5,23 +5,32 @@
     <p:sldMasterId id="2147483672" r:id="rId1"/>
   </p:sldMasterIdLst>
   <p:notesMasterIdLst>
-    <p:notesMasterId r:id="rId16"/>
+    <p:notesMasterId r:id="rId25"/>
   </p:notesMasterIdLst>
   <p:sldIdLst>
     <p:sldId id="537" r:id="rId2"/>
     <p:sldId id="538" r:id="rId3"/>
     <p:sldId id="539" r:id="rId4"/>
-    <p:sldId id="541" r:id="rId5"/>
-    <p:sldId id="542" r:id="rId6"/>
-    <p:sldId id="543" r:id="rId7"/>
-    <p:sldId id="544" r:id="rId8"/>
-    <p:sldId id="545" r:id="rId9"/>
-    <p:sldId id="550" r:id="rId10"/>
-    <p:sldId id="551" r:id="rId11"/>
-    <p:sldId id="546" r:id="rId12"/>
-    <p:sldId id="547" r:id="rId13"/>
-    <p:sldId id="548" r:id="rId14"/>
-    <p:sldId id="549" r:id="rId15"/>
+    <p:sldId id="552" r:id="rId5"/>
+    <p:sldId id="553" r:id="rId6"/>
+    <p:sldId id="554" r:id="rId7"/>
+    <p:sldId id="555" r:id="rId8"/>
+    <p:sldId id="556" r:id="rId9"/>
+    <p:sldId id="557" r:id="rId10"/>
+    <p:sldId id="558" r:id="rId11"/>
+    <p:sldId id="559" r:id="rId12"/>
+    <p:sldId id="560" r:id="rId13"/>
+    <p:sldId id="541" r:id="rId14"/>
+    <p:sldId id="542" r:id="rId15"/>
+    <p:sldId id="543" r:id="rId16"/>
+    <p:sldId id="544" r:id="rId17"/>
+    <p:sldId id="545" r:id="rId18"/>
+    <p:sldId id="550" r:id="rId19"/>
+    <p:sldId id="551" r:id="rId20"/>
+    <p:sldId id="546" r:id="rId21"/>
+    <p:sldId id="547" r:id="rId22"/>
+    <p:sldId id="548" r:id="rId23"/>
+    <p:sldId id="549" r:id="rId24"/>
   </p:sldIdLst>
   <p:sldSz cx="9144000" cy="6858000" type="screen4x3"/>
   <p:notesSz cx="6858000" cy="9144000"/>
@@ -128,6 +137,15 @@
             <p14:sldId id="537"/>
             <p14:sldId id="538"/>
             <p14:sldId id="539"/>
+            <p14:sldId id="552"/>
+            <p14:sldId id="553"/>
+            <p14:sldId id="554"/>
+            <p14:sldId id="555"/>
+            <p14:sldId id="556"/>
+            <p14:sldId id="557"/>
+            <p14:sldId id="558"/>
+            <p14:sldId id="559"/>
+            <p14:sldId id="560"/>
             <p14:sldId id="541"/>
             <p14:sldId id="542"/>
             <p14:sldId id="543"/>
@@ -251,7 +269,7 @@
           <a:p>
             <a:fld id="{821CEFAF-F731-4255-8A20-7C00833F6E51}" type="datetimeFigureOut">
               <a:rPr lang="en-US" smtClean="0"/>
-              <a:t>1/21/2020</a:t>
+              <a:t>1/22/2020</a:t>
             </a:fld>
             <a:endParaRPr lang="en-US"/>
           </a:p>
@@ -3775,7 +3793,7 @@
           <a:p>
             <a:r>
               <a:rPr lang="en-US"/>
-              <a:t>Jan. 21, 2020</a:t>
+              <a:t>Jan. 22, 2020</a:t>
             </a:r>
           </a:p>
         </p:txBody>
@@ -3815,7 +3833,7 @@
           <p:cNvPr id="2" name="Title 1">
             <a:extLst>
               <a:ext uri="{FF2B5EF4-FFF2-40B4-BE49-F238E27FC236}">
-                <a16:creationId xmlns:a16="http://schemas.microsoft.com/office/drawing/2014/main" id="{2828DFE0-B344-4039-BC02-FAA228C857B6}"/>
+                <a16:creationId xmlns:a16="http://schemas.microsoft.com/office/drawing/2014/main" id="{0F0D14B4-4277-45B9-9E06-B74735AFF18B}"/>
               </a:ext>
             </a:extLst>
           </p:cNvPr>
@@ -3833,260 +3851,40 @@
           <a:p>
             <a:r>
               <a:rPr lang="en-US"/>
-              <a:t>Azeotropes</a:t>
-            </a:r>
-          </a:p>
-        </p:txBody>
-      </p:sp>
-      <p:pic>
-        <p:nvPicPr>
-          <p:cNvPr id="5" name="Picture 4" descr="A close up of a map&#10;&#10;Description automatically generated">
+              <a:t>Selection of Display Options</a:t>
+            </a:r>
+          </a:p>
+        </p:txBody>
+      </p:sp>
+      <p:sp>
+        <p:nvSpPr>
+          <p:cNvPr id="3" name="Content Placeholder 2">
             <a:extLst>
               <a:ext uri="{FF2B5EF4-FFF2-40B4-BE49-F238E27FC236}">
-                <a16:creationId xmlns:a16="http://schemas.microsoft.com/office/drawing/2014/main" id="{6A540D37-43A9-4F36-A2D4-3C5CA0056F43}"/>
+                <a16:creationId xmlns:a16="http://schemas.microsoft.com/office/drawing/2014/main" id="{348CAB2E-0CFE-4CCE-A703-2944B9F0DCB7}"/>
               </a:ext>
             </a:extLst>
           </p:cNvPr>
-          <p:cNvPicPr>
-            <a:picLocks noChangeAspect="1"/>
-          </p:cNvPicPr>
-          <p:nvPr/>
-        </p:nvPicPr>
-        <p:blipFill rotWithShape="1">
-          <a:blip r:embed="rId2">
-            <a:extLst>
-              <a:ext uri="{28A0092B-C50C-407E-A947-70E740481C1C}">
-                <a14:useLocalDpi xmlns:a14="http://schemas.microsoft.com/office/drawing/2010/main" val="0"/>
-              </a:ext>
-            </a:extLst>
-          </a:blip>
-          <a:srcRect r="59293" b="63320"/>
-          <a:stretch/>
-        </p:blipFill>
-        <p:spPr>
-          <a:xfrm>
-            <a:off x="123246" y="877029"/>
-            <a:ext cx="2468880" cy="2256345"/>
-          </a:xfrm>
-          <a:prstGeom prst="rect">
-            <a:avLst/>
-          </a:prstGeom>
-        </p:spPr>
-      </p:pic>
-      <p:pic>
-        <p:nvPicPr>
-          <p:cNvPr id="7" name="Picture 6" descr="A close up of a map&#10;&#10;Description automatically generated">
-            <a:extLst>
-              <a:ext uri="{FF2B5EF4-FFF2-40B4-BE49-F238E27FC236}">
-                <a16:creationId xmlns:a16="http://schemas.microsoft.com/office/drawing/2014/main" id="{353C4CC4-A588-4328-A792-4504BD932F12}"/>
-              </a:ext>
-            </a:extLst>
-          </p:cNvPr>
-          <p:cNvPicPr>
-            <a:picLocks noChangeAspect="1"/>
-          </p:cNvPicPr>
-          <p:nvPr/>
-        </p:nvPicPr>
-        <p:blipFill rotWithShape="1">
-          <a:blip r:embed="rId3">
-            <a:extLst>
-              <a:ext uri="{28A0092B-C50C-407E-A947-70E740481C1C}">
-                <a14:useLocalDpi xmlns:a14="http://schemas.microsoft.com/office/drawing/2010/main" val="0"/>
-              </a:ext>
-            </a:extLst>
-          </a:blip>
-          <a:srcRect l="5416" t="3171" r="57761" b="64664"/>
-          <a:stretch/>
-        </p:blipFill>
-        <p:spPr>
-          <a:xfrm>
-            <a:off x="209269" y="3201092"/>
-            <a:ext cx="2296834" cy="2205828"/>
-          </a:xfrm>
-          <a:prstGeom prst="rect">
-            <a:avLst/>
-          </a:prstGeom>
-        </p:spPr>
-      </p:pic>
-      <p:pic>
-        <p:nvPicPr>
-          <p:cNvPr id="8" name="Picture 7" descr="A close up of a map&#10;&#10;Description automatically generated">
-            <a:extLst>
-              <a:ext uri="{FF2B5EF4-FFF2-40B4-BE49-F238E27FC236}">
-                <a16:creationId xmlns:a16="http://schemas.microsoft.com/office/drawing/2014/main" id="{1F9A4277-4E71-4750-A6BD-5F39B0DDF58B}"/>
-              </a:ext>
-            </a:extLst>
-          </p:cNvPr>
-          <p:cNvPicPr>
-            <a:picLocks noChangeAspect="1"/>
-          </p:cNvPicPr>
-          <p:nvPr/>
-        </p:nvPicPr>
-        <p:blipFill rotWithShape="1">
-          <a:blip r:embed="rId2">
-            <a:extLst>
-              <a:ext uri="{28A0092B-C50C-407E-A947-70E740481C1C}">
-                <a14:useLocalDpi xmlns:a14="http://schemas.microsoft.com/office/drawing/2010/main" val="0"/>
-              </a:ext>
-            </a:extLst>
-          </a:blip>
-          <a:srcRect l="45016" r="4801" b="63320"/>
-          <a:stretch/>
-        </p:blipFill>
-        <p:spPr>
-          <a:xfrm>
-            <a:off x="2912211" y="1121488"/>
-            <a:ext cx="2468880" cy="1830263"/>
-          </a:xfrm>
-          <a:prstGeom prst="rect">
-            <a:avLst/>
-          </a:prstGeom>
-        </p:spPr>
-      </p:pic>
-      <p:pic>
-        <p:nvPicPr>
-          <p:cNvPr id="9" name="Picture 8" descr="A close up of a map&#10;&#10;Description automatically generated">
-            <a:extLst>
-              <a:ext uri="{FF2B5EF4-FFF2-40B4-BE49-F238E27FC236}">
-                <a16:creationId xmlns:a16="http://schemas.microsoft.com/office/drawing/2014/main" id="{4C85ADED-2749-409C-B1AF-7CFCF267195E}"/>
-              </a:ext>
-            </a:extLst>
-          </p:cNvPr>
-          <p:cNvPicPr>
-            <a:picLocks noChangeAspect="1"/>
-          </p:cNvPicPr>
-          <p:nvPr/>
-        </p:nvPicPr>
-        <p:blipFill rotWithShape="1">
-          <a:blip r:embed="rId3">
-            <a:extLst>
-              <a:ext uri="{28A0092B-C50C-407E-A947-70E740481C1C}">
-                <a14:useLocalDpi xmlns:a14="http://schemas.microsoft.com/office/drawing/2010/main" val="0"/>
-              </a:ext>
-            </a:extLst>
-          </a:blip>
-          <a:srcRect l="6254" t="38553" r="47821" b="30672"/>
-          <a:stretch/>
-        </p:blipFill>
-        <p:spPr>
-          <a:xfrm>
-            <a:off x="2775051" y="3293462"/>
-            <a:ext cx="2743200" cy="2021087"/>
-          </a:xfrm>
-          <a:prstGeom prst="rect">
-            <a:avLst/>
-          </a:prstGeom>
-        </p:spPr>
-      </p:pic>
-      <p:pic>
-        <p:nvPicPr>
-          <p:cNvPr id="10" name="Picture 9" descr="A close up of a map&#10;&#10;Description automatically generated">
-            <a:extLst>
-              <a:ext uri="{FF2B5EF4-FFF2-40B4-BE49-F238E27FC236}">
-                <a16:creationId xmlns:a16="http://schemas.microsoft.com/office/drawing/2014/main" id="{84876304-F302-45DB-9B0A-F075462FC01A}"/>
-              </a:ext>
-            </a:extLst>
-          </p:cNvPr>
-          <p:cNvPicPr>
-            <a:picLocks noChangeAspect="1"/>
-          </p:cNvPicPr>
-          <p:nvPr/>
-        </p:nvPicPr>
-        <p:blipFill rotWithShape="1">
-          <a:blip r:embed="rId2">
-            <a:extLst>
-              <a:ext uri="{28A0092B-C50C-407E-A947-70E740481C1C}">
-                <a14:useLocalDpi xmlns:a14="http://schemas.microsoft.com/office/drawing/2010/main" val="0"/>
-              </a:ext>
-            </a:extLst>
-          </a:blip>
-          <a:srcRect l="16536" t="36220" r="24917" b="29282"/>
-          <a:stretch/>
-        </p:blipFill>
-        <p:spPr>
-          <a:xfrm>
-            <a:off x="5701176" y="1121489"/>
-            <a:ext cx="2880360" cy="1721386"/>
-          </a:xfrm>
-          <a:prstGeom prst="rect">
-            <a:avLst/>
-          </a:prstGeom>
-        </p:spPr>
-      </p:pic>
-      <p:pic>
-        <p:nvPicPr>
-          <p:cNvPr id="11" name="Picture 10" descr="A close up of a map&#10;&#10;Description automatically generated">
-            <a:extLst>
-              <a:ext uri="{FF2B5EF4-FFF2-40B4-BE49-F238E27FC236}">
-                <a16:creationId xmlns:a16="http://schemas.microsoft.com/office/drawing/2014/main" id="{4E572A3B-4D7E-4443-9547-745DEDE04CBA}"/>
-              </a:ext>
-            </a:extLst>
-          </p:cNvPr>
-          <p:cNvPicPr>
-            <a:picLocks noChangeAspect="1"/>
-          </p:cNvPicPr>
-          <p:nvPr/>
-        </p:nvPicPr>
-        <p:blipFill rotWithShape="1">
-          <a:blip r:embed="rId3">
-            <a:extLst>
-              <a:ext uri="{28A0092B-C50C-407E-A947-70E740481C1C}">
-                <a14:useLocalDpi xmlns:a14="http://schemas.microsoft.com/office/drawing/2010/main" val="0"/>
-              </a:ext>
-            </a:extLst>
-          </a:blip>
-          <a:srcRect l="61218" t="3250" r="4232" b="65796"/>
-          <a:stretch/>
-        </p:blipFill>
-        <p:spPr>
-          <a:xfrm>
-            <a:off x="7080273" y="3516397"/>
-            <a:ext cx="2063727" cy="2032808"/>
-          </a:xfrm>
-          <a:prstGeom prst="rect">
-            <a:avLst/>
-          </a:prstGeom>
-        </p:spPr>
-      </p:pic>
-      <p:pic>
-        <p:nvPicPr>
-          <p:cNvPr id="12" name="Picture 11" descr="A close up of a map&#10;&#10;Description automatically generated">
-            <a:extLst>
-              <a:ext uri="{FF2B5EF4-FFF2-40B4-BE49-F238E27FC236}">
-                <a16:creationId xmlns:a16="http://schemas.microsoft.com/office/drawing/2014/main" id="{DFCD9139-9129-4F8B-B1F0-909086A20C04}"/>
-              </a:ext>
-            </a:extLst>
-          </p:cNvPr>
-          <p:cNvPicPr>
-            <a:picLocks noChangeAspect="1"/>
-          </p:cNvPicPr>
-          <p:nvPr/>
-        </p:nvPicPr>
-        <p:blipFill rotWithShape="1">
-          <a:blip r:embed="rId3">
-            <a:extLst>
-              <a:ext uri="{28A0092B-C50C-407E-A947-70E740481C1C}">
-                <a14:useLocalDpi xmlns:a14="http://schemas.microsoft.com/office/drawing/2010/main" val="0"/>
-              </a:ext>
-            </a:extLst>
-          </a:blip>
-          <a:srcRect l="61218" t="37685" r="4232" b="30827"/>
-          <a:stretch/>
-        </p:blipFill>
-        <p:spPr>
-          <a:xfrm>
-            <a:off x="4963353" y="3588389"/>
-            <a:ext cx="2063727" cy="2067871"/>
-          </a:xfrm>
-          <a:prstGeom prst="rect">
-            <a:avLst/>
-          </a:prstGeom>
-        </p:spPr>
-      </p:pic>
+          <p:cNvSpPr>
+            <a:spLocks noGrp="1"/>
+          </p:cNvSpPr>
+          <p:nvPr>
+            <p:ph idx="1"/>
+          </p:nvPr>
+        </p:nvSpPr>
+        <p:spPr/>
+        <p:txBody>
+          <a:bodyPr/>
+          <a:lstStyle/>
+          <a:p>
+            <a:endParaRPr lang="en-US"/>
+          </a:p>
+        </p:txBody>
+      </p:sp>
     </p:spTree>
     <p:extLst>
       <p:ext uri="{BB962C8B-B14F-4D97-AF65-F5344CB8AC3E}">
-        <p14:creationId xmlns:p14="http://schemas.microsoft.com/office/powerpoint/2010/main" val="489406185"/>
+        <p14:creationId xmlns:p14="http://schemas.microsoft.com/office/powerpoint/2010/main" val="4251782782"/>
       </p:ext>
     </p:extLst>
   </p:cSld>
@@ -4118,7 +3916,7 @@
           <p:cNvPr id="2" name="Title 1">
             <a:extLst>
               <a:ext uri="{FF2B5EF4-FFF2-40B4-BE49-F238E27FC236}">
-                <a16:creationId xmlns:a16="http://schemas.microsoft.com/office/drawing/2014/main" id="{E75BED42-B1CA-4FED-BFB8-FD2258A9FA9A}"/>
+                <a16:creationId xmlns:a16="http://schemas.microsoft.com/office/drawing/2014/main" id="{4C6A77E7-2B90-47F4-A7A5-79973281A2B1}"/>
               </a:ext>
             </a:extLst>
           </p:cNvPr>
@@ -4136,96 +3934,40 @@
           <a:p>
             <a:r>
               <a:rPr lang="en-US"/>
-              <a:t>Separations for the HDA Process</a:t>
-            </a:r>
-          </a:p>
-        </p:txBody>
-      </p:sp>
-      <p:pic>
-        <p:nvPicPr>
-          <p:cNvPr id="5" name="Picture 4" descr="A picture containing text, map&#10;&#10;Description automatically generated">
+              <a:t>Selection of Convergence Criteria</a:t>
+            </a:r>
+          </a:p>
+        </p:txBody>
+      </p:sp>
+      <p:sp>
+        <p:nvSpPr>
+          <p:cNvPr id="3" name="Content Placeholder 2">
             <a:extLst>
               <a:ext uri="{FF2B5EF4-FFF2-40B4-BE49-F238E27FC236}">
-                <a16:creationId xmlns:a16="http://schemas.microsoft.com/office/drawing/2014/main" id="{EB2BCE3E-C949-48D9-9154-98696AD49477}"/>
+                <a16:creationId xmlns:a16="http://schemas.microsoft.com/office/drawing/2014/main" id="{F74E31A3-5260-4F53-A056-1334CC676A4D}"/>
               </a:ext>
             </a:extLst>
           </p:cNvPr>
-          <p:cNvPicPr>
-            <a:picLocks noChangeAspect="1"/>
-          </p:cNvPicPr>
-          <p:nvPr/>
-        </p:nvPicPr>
-        <p:blipFill rotWithShape="1">
-          <a:blip r:embed="rId2">
-            <a:extLst>
-              <a:ext uri="{28A0092B-C50C-407E-A947-70E740481C1C}">
-                <a14:useLocalDpi xmlns:a14="http://schemas.microsoft.com/office/drawing/2010/main" val="0"/>
-              </a:ext>
-            </a:extLst>
-          </a:blip>
-          <a:srcRect l="6274" t="21928" r="7598" b="9952"/>
-          <a:stretch/>
-        </p:blipFill>
-        <p:spPr>
-          <a:xfrm>
-            <a:off x="897067" y="819059"/>
-            <a:ext cx="6855625" cy="4206240"/>
-          </a:xfrm>
-          <a:prstGeom prst="rect">
-            <a:avLst/>
-          </a:prstGeom>
-        </p:spPr>
-      </p:pic>
-      <p:pic>
-        <p:nvPicPr>
-          <p:cNvPr id="7" name="Picture 6" descr="A close up of a piece of paper&#10;&#10;Description automatically generated">
-            <a:extLst>
-              <a:ext uri="{FF2B5EF4-FFF2-40B4-BE49-F238E27FC236}">
-                <a16:creationId xmlns:a16="http://schemas.microsoft.com/office/drawing/2014/main" id="{B49D7C8F-B94D-4FB9-8B6F-686685704564}"/>
-              </a:ext>
-            </a:extLst>
-          </p:cNvPr>
-          <p:cNvPicPr>
-            <a:picLocks noChangeAspect="1"/>
-          </p:cNvPicPr>
-          <p:nvPr/>
-        </p:nvPicPr>
-        <p:blipFill>
-          <a:blip r:embed="rId3">
-            <a:clrChange>
-              <a:clrFrom>
-                <a:srgbClr val="BFBFBF"/>
-              </a:clrFrom>
-              <a:clrTo>
-                <a:srgbClr val="BFBFBF">
-                  <a:alpha val="0"/>
-                </a:srgbClr>
-              </a:clrTo>
-            </a:clrChange>
-            <a:extLst>
-              <a:ext uri="{28A0092B-C50C-407E-A947-70E740481C1C}">
-                <a14:useLocalDpi xmlns:a14="http://schemas.microsoft.com/office/drawing/2010/main" val="0"/>
-              </a:ext>
-            </a:extLst>
-          </a:blip>
-          <a:stretch>
-            <a:fillRect/>
-          </a:stretch>
-        </p:blipFill>
-        <p:spPr>
-          <a:xfrm>
-            <a:off x="0" y="4851055"/>
-            <a:ext cx="9144000" cy="2006945"/>
-          </a:xfrm>
-          <a:prstGeom prst="rect">
-            <a:avLst/>
-          </a:prstGeom>
-        </p:spPr>
-      </p:pic>
+          <p:cNvSpPr>
+            <a:spLocks noGrp="1"/>
+          </p:cNvSpPr>
+          <p:nvPr>
+            <p:ph idx="1"/>
+          </p:nvPr>
+        </p:nvSpPr>
+        <p:spPr/>
+        <p:txBody>
+          <a:bodyPr/>
+          <a:lstStyle/>
+          <a:p>
+            <a:endParaRPr lang="en-US"/>
+          </a:p>
+        </p:txBody>
+      </p:sp>
     </p:spTree>
     <p:extLst>
       <p:ext uri="{BB962C8B-B14F-4D97-AF65-F5344CB8AC3E}">
-        <p14:creationId xmlns:p14="http://schemas.microsoft.com/office/powerpoint/2010/main" val="1673484135"/>
+        <p14:creationId xmlns:p14="http://schemas.microsoft.com/office/powerpoint/2010/main" val="879785427"/>
       </p:ext>
     </p:extLst>
   </p:cSld>
@@ -4257,7 +3999,7 @@
           <p:cNvPr id="2" name="Title 1">
             <a:extLst>
               <a:ext uri="{FF2B5EF4-FFF2-40B4-BE49-F238E27FC236}">
-                <a16:creationId xmlns:a16="http://schemas.microsoft.com/office/drawing/2014/main" id="{8D6B3EAB-40DE-4578-8000-D745A55DE45F}"/>
+                <a16:creationId xmlns:a16="http://schemas.microsoft.com/office/drawing/2014/main" id="{E3D51C49-031B-4C65-80F2-3B176C969491}"/>
               </a:ext>
             </a:extLst>
           </p:cNvPr>
@@ -4275,155 +4017,40 @@
           <a:p>
             <a:r>
               <a:rPr lang="en-US"/>
-              <a:t>Additional Heuristics</a:t>
-            </a:r>
-          </a:p>
-        </p:txBody>
-      </p:sp>
-      <p:pic>
-        <p:nvPicPr>
-          <p:cNvPr id="5" name="Picture 4" descr="A screenshot of text&#10;&#10;Description automatically generated">
+              <a:t>Handling Recycle Streams</a:t>
+            </a:r>
+          </a:p>
+        </p:txBody>
+      </p:sp>
+      <p:sp>
+        <p:nvSpPr>
+          <p:cNvPr id="3" name="Content Placeholder 2">
             <a:extLst>
               <a:ext uri="{FF2B5EF4-FFF2-40B4-BE49-F238E27FC236}">
-                <a16:creationId xmlns:a16="http://schemas.microsoft.com/office/drawing/2014/main" id="{07E716E3-52D3-4B47-BC48-576C86FF2217}"/>
+                <a16:creationId xmlns:a16="http://schemas.microsoft.com/office/drawing/2014/main" id="{2509E6DF-3C62-4BC9-AE70-F731152B24F2}"/>
               </a:ext>
             </a:extLst>
           </p:cNvPr>
-          <p:cNvPicPr>
-            <a:picLocks noChangeAspect="1"/>
-          </p:cNvPicPr>
-          <p:nvPr/>
-        </p:nvPicPr>
-        <p:blipFill rotWithShape="1">
-          <a:blip r:embed="rId2">
-            <a:extLst>
-              <a:ext uri="{28A0092B-C50C-407E-A947-70E740481C1C}">
-                <a14:useLocalDpi xmlns:a14="http://schemas.microsoft.com/office/drawing/2010/main" val="0"/>
-              </a:ext>
-            </a:extLst>
-          </a:blip>
-          <a:srcRect l="4731" r="2408" b="30033"/>
-          <a:stretch/>
-        </p:blipFill>
-        <p:spPr>
-          <a:xfrm>
-            <a:off x="173346" y="886309"/>
-            <a:ext cx="3657600" cy="2597726"/>
-          </a:xfrm>
-          <a:prstGeom prst="rect">
-            <a:avLst/>
-          </a:prstGeom>
-        </p:spPr>
-      </p:pic>
-      <p:pic>
-        <p:nvPicPr>
-          <p:cNvPr id="7" name="Picture 6" descr="A close up of text on a black background&#10;&#10;Description automatically generated">
-            <a:extLst>
-              <a:ext uri="{FF2B5EF4-FFF2-40B4-BE49-F238E27FC236}">
-                <a16:creationId xmlns:a16="http://schemas.microsoft.com/office/drawing/2014/main" id="{AF63875D-9A2A-4050-B9FC-18259EE2FB2A}"/>
-              </a:ext>
-            </a:extLst>
-          </p:cNvPr>
-          <p:cNvPicPr>
-            <a:picLocks noChangeAspect="1"/>
-          </p:cNvPicPr>
-          <p:nvPr/>
-        </p:nvPicPr>
-        <p:blipFill rotWithShape="1">
-          <a:blip r:embed="rId3">
-            <a:extLst>
-              <a:ext uri="{28A0092B-C50C-407E-A947-70E740481C1C}">
-                <a14:useLocalDpi xmlns:a14="http://schemas.microsoft.com/office/drawing/2010/main" val="0"/>
-              </a:ext>
-            </a:extLst>
-          </a:blip>
-          <a:srcRect l="1135" r="2053" b="28172"/>
-          <a:stretch/>
-        </p:blipFill>
-        <p:spPr>
-          <a:xfrm>
-            <a:off x="464567" y="3626065"/>
-            <a:ext cx="3291840" cy="2955545"/>
-          </a:xfrm>
-          <a:prstGeom prst="rect">
-            <a:avLst/>
-          </a:prstGeom>
-        </p:spPr>
-      </p:pic>
-      <p:pic>
-        <p:nvPicPr>
-          <p:cNvPr id="9" name="Picture 8" descr="A close up of text on a black background&#10;&#10;Description automatically generated">
-            <a:extLst>
-              <a:ext uri="{FF2B5EF4-FFF2-40B4-BE49-F238E27FC236}">
-                <a16:creationId xmlns:a16="http://schemas.microsoft.com/office/drawing/2014/main" id="{5E608C07-3F79-4B13-9038-558B8C395F63}"/>
-              </a:ext>
-            </a:extLst>
-          </p:cNvPr>
-          <p:cNvPicPr>
-            <a:picLocks noChangeAspect="1"/>
-          </p:cNvPicPr>
-          <p:nvPr/>
-        </p:nvPicPr>
-        <p:blipFill rotWithShape="1">
-          <a:blip r:embed="rId4">
-            <a:extLst>
-              <a:ext uri="{28A0092B-C50C-407E-A947-70E740481C1C}">
-                <a14:useLocalDpi xmlns:a14="http://schemas.microsoft.com/office/drawing/2010/main" val="0"/>
-              </a:ext>
-            </a:extLst>
-          </a:blip>
-          <a:srcRect l="3097" r="1815" b="21574"/>
-          <a:stretch/>
-        </p:blipFill>
-        <p:spPr>
-          <a:xfrm>
-            <a:off x="4647841" y="818151"/>
-            <a:ext cx="3657600" cy="3827521"/>
-          </a:xfrm>
-          <a:prstGeom prst="rect">
-            <a:avLst/>
-          </a:prstGeom>
-        </p:spPr>
-      </p:pic>
-      <p:pic>
-        <p:nvPicPr>
-          <p:cNvPr id="11" name="Picture 10" descr="A close up of text on a white background&#10;&#10;Description automatically generated">
-            <a:extLst>
-              <a:ext uri="{FF2B5EF4-FFF2-40B4-BE49-F238E27FC236}">
-                <a16:creationId xmlns:a16="http://schemas.microsoft.com/office/drawing/2014/main" id="{63E722BE-A7A7-40AD-A82E-67C21DBB611B}"/>
-              </a:ext>
-            </a:extLst>
-          </p:cNvPr>
-          <p:cNvPicPr>
-            <a:picLocks noChangeAspect="1"/>
-          </p:cNvPicPr>
-          <p:nvPr/>
-        </p:nvPicPr>
-        <p:blipFill rotWithShape="1">
-          <a:blip r:embed="rId5">
-            <a:extLst>
-              <a:ext uri="{28A0092B-C50C-407E-A947-70E740481C1C}">
-                <a14:useLocalDpi xmlns:a14="http://schemas.microsoft.com/office/drawing/2010/main" val="0"/>
-              </a:ext>
-            </a:extLst>
-          </a:blip>
-          <a:srcRect l="3839" t="1" r="3744" b="40602"/>
-          <a:stretch/>
-        </p:blipFill>
-        <p:spPr>
-          <a:xfrm>
-            <a:off x="4647841" y="4780600"/>
-            <a:ext cx="3657600" cy="1751644"/>
-          </a:xfrm>
-          <a:prstGeom prst="rect">
-            <a:avLst/>
-          </a:prstGeom>
-        </p:spPr>
-      </p:pic>
+          <p:cNvSpPr>
+            <a:spLocks noGrp="1"/>
+          </p:cNvSpPr>
+          <p:nvPr>
+            <p:ph idx="1"/>
+          </p:nvPr>
+        </p:nvSpPr>
+        <p:spPr/>
+        <p:txBody>
+          <a:bodyPr/>
+          <a:lstStyle/>
+          <a:p>
+            <a:endParaRPr lang="en-US"/>
+          </a:p>
+        </p:txBody>
+      </p:sp>
     </p:spTree>
     <p:extLst>
       <p:ext uri="{BB962C8B-B14F-4D97-AF65-F5344CB8AC3E}">
-        <p14:creationId xmlns:p14="http://schemas.microsoft.com/office/powerpoint/2010/main" val="1653418848"/>
+        <p14:creationId xmlns:p14="http://schemas.microsoft.com/office/powerpoint/2010/main" val="516878144"/>
       </p:ext>
     </p:extLst>
   </p:cSld>
@@ -4455,7 +4082,7 @@
           <p:cNvPr id="2" name="Title 1">
             <a:extLst>
               <a:ext uri="{FF2B5EF4-FFF2-40B4-BE49-F238E27FC236}">
-                <a16:creationId xmlns:a16="http://schemas.microsoft.com/office/drawing/2014/main" id="{8A1A5676-07A6-4D68-A40B-84378C80F9A3}"/>
+                <a16:creationId xmlns:a16="http://schemas.microsoft.com/office/drawing/2014/main" id="{773BE34D-B7F9-46A1-928B-E3954D878E86}"/>
               </a:ext>
             </a:extLst>
           </p:cNvPr>
@@ -4473,7 +4100,7 @@
           <a:p>
             <a:r>
               <a:rPr lang="en-US"/>
-              <a:t>Additional Heuristics</a:t>
+              <a:t>What is a heuristic?</a:t>
             </a:r>
           </a:p>
         </p:txBody>
@@ -4483,7 +4110,7 @@
           <p:cNvPr id="3" name="Content Placeholder 2">
             <a:extLst>
               <a:ext uri="{FF2B5EF4-FFF2-40B4-BE49-F238E27FC236}">
-                <a16:creationId xmlns:a16="http://schemas.microsoft.com/office/drawing/2014/main" id="{7DE38775-71F4-4534-9E5A-AAA9F8602686}"/>
+                <a16:creationId xmlns:a16="http://schemas.microsoft.com/office/drawing/2014/main" id="{B6BBBE54-2734-4858-BC37-0D2D6281D997}"/>
               </a:ext>
             </a:extLst>
           </p:cNvPr>
@@ -4496,8 +4123,8 @@
         </p:nvSpPr>
         <p:spPr>
           <a:xfrm>
-            <a:off x="56608" y="816175"/>
-            <a:ext cx="3817674" cy="2009363"/>
+            <a:off x="663319" y="1153318"/>
+            <a:ext cx="7886700" cy="4551363"/>
           </a:xfrm>
         </p:spPr>
         <p:txBody>
@@ -4506,73 +4133,70 @@
           </a:bodyPr>
           <a:lstStyle/>
           <a:p>
-            <a:r>
-              <a:rPr lang="en-US" sz="2000"/>
-              <a:t>Use the design heuristics from C11 to size the following pieces of equipment:</a:t>
-            </a:r>
-          </a:p>
-          <a:p>
-            <a:pPr lvl="1"/>
-            <a:r>
-              <a:rPr lang="en-US"/>
-              <a:t>V-102</a:t>
-            </a:r>
-          </a:p>
-          <a:p>
-            <a:pPr lvl="1"/>
-            <a:r>
-              <a:rPr lang="en-US"/>
-              <a:t>E-105</a:t>
-            </a:r>
-          </a:p>
-          <a:p>
-            <a:pPr lvl="1"/>
-            <a:r>
-              <a:rPr lang="en-US"/>
-              <a:t>T-101</a:t>
-            </a:r>
-          </a:p>
-        </p:txBody>
-      </p:sp>
-      <p:pic>
-        <p:nvPicPr>
-          <p:cNvPr id="4" name="Picture 3" descr="A picture containing text, map&#10;&#10;Description automatically generated">
-            <a:extLst>
-              <a:ext uri="{FF2B5EF4-FFF2-40B4-BE49-F238E27FC236}">
-                <a16:creationId xmlns:a16="http://schemas.microsoft.com/office/drawing/2014/main" id="{EE5CCCF4-9469-4551-813B-DE4C3FF50B55}"/>
-              </a:ext>
-            </a:extLst>
-          </p:cNvPr>
-          <p:cNvPicPr>
-            <a:picLocks noChangeAspect="1"/>
-          </p:cNvPicPr>
-          <p:nvPr/>
-        </p:nvPicPr>
-        <p:blipFill rotWithShape="1">
-          <a:blip r:embed="rId2">
-            <a:extLst>
-              <a:ext uri="{28A0092B-C50C-407E-A947-70E740481C1C}">
-                <a14:useLocalDpi xmlns:a14="http://schemas.microsoft.com/office/drawing/2010/main" val="0"/>
-              </a:ext>
-            </a:extLst>
-          </a:blip>
-          <a:srcRect l="6274" t="21928" r="7598" b="9952"/>
-          <a:stretch/>
-        </p:blipFill>
-        <p:spPr>
-          <a:xfrm>
-            <a:off x="1742129" y="2548185"/>
-            <a:ext cx="6855625" cy="4206240"/>
-          </a:xfrm>
-          <a:prstGeom prst="rect">
-            <a:avLst/>
-          </a:prstGeom>
-        </p:spPr>
-      </p:pic>
+            <a:pPr marL="0" indent="0">
+              <a:buNone/>
+            </a:pPr>
+            <a:r>
+              <a:rPr lang="en-US"/>
+              <a:t>A </a:t>
+            </a:r>
+            <a:r>
+              <a:rPr lang="en-US" b="1" i="1"/>
+              <a:t>heuristic </a:t>
+            </a:r>
+            <a:r>
+              <a:rPr lang="en-US"/>
+              <a:t>is an experience-based shortcut calculation method or guideline:</a:t>
+            </a:r>
+          </a:p>
+          <a:p>
+            <a:pPr marL="0" indent="0">
+              <a:buNone/>
+            </a:pPr>
+            <a:endParaRPr lang="en-US"/>
+          </a:p>
+          <a:p>
+            <a:pPr marL="457200" indent="-457200">
+              <a:buAutoNum type="arabicPeriod"/>
+            </a:pPr>
+            <a:r>
+              <a:rPr lang="en-US"/>
+              <a:t>A heuristic does not guarantee a solution.</a:t>
+            </a:r>
+          </a:p>
+          <a:p>
+            <a:pPr marL="457200" indent="-457200">
+              <a:buAutoNum type="arabicPeriod"/>
+            </a:pPr>
+            <a:r>
+              <a:rPr lang="en-US"/>
+              <a:t>It may contradict other heuristics</a:t>
+            </a:r>
+          </a:p>
+          <a:p>
+            <a:pPr marL="457200" indent="-457200">
+              <a:buAutoNum type="arabicPeriod"/>
+            </a:pPr>
+            <a:r>
+              <a:rPr lang="en-US"/>
+              <a:t>It can reduce the time to solve a problem.</a:t>
+            </a:r>
+          </a:p>
+          <a:p>
+            <a:pPr marL="457200" indent="-457200">
+              <a:buAutoNum type="arabicPeriod"/>
+            </a:pPr>
+            <a:r>
+              <a:rPr lang="en-US"/>
+              <a:t>Its acceptance depends on the immediate context instead of an absolute standard.</a:t>
+            </a:r>
+          </a:p>
+        </p:txBody>
+      </p:sp>
     </p:spTree>
     <p:extLst>
       <p:ext uri="{BB962C8B-B14F-4D97-AF65-F5344CB8AC3E}">
-        <p14:creationId xmlns:p14="http://schemas.microsoft.com/office/powerpoint/2010/main" val="3512291295"/>
+        <p14:creationId xmlns:p14="http://schemas.microsoft.com/office/powerpoint/2010/main" val="368098642"/>
       </p:ext>
     </p:extLst>
   </p:cSld>
@@ -4583,155 +4207,6 @@
 </file>
 
 <file path=ppt/slides/slide14.xml><?xml version="1.0" encoding="utf-8"?>
-<p:sld xmlns:a="http://schemas.openxmlformats.org/drawingml/2006/main" xmlns:r="http://schemas.openxmlformats.org/officeDocument/2006/relationships" xmlns:p="http://schemas.openxmlformats.org/presentationml/2006/main">
-  <p:cSld>
-    <p:spTree>
-      <p:nvGrpSpPr>
-        <p:cNvPr id="1" name=""/>
-        <p:cNvGrpSpPr/>
-        <p:nvPr/>
-      </p:nvGrpSpPr>
-      <p:grpSpPr>
-        <a:xfrm>
-          <a:off x="0" y="0"/>
-          <a:ext cx="0" cy="0"/>
-          <a:chOff x="0" y="0"/>
-          <a:chExt cx="0" cy="0"/>
-        </a:xfrm>
-      </p:grpSpPr>
-      <p:sp>
-        <p:nvSpPr>
-          <p:cNvPr id="2" name="Title 1">
-            <a:extLst>
-              <a:ext uri="{FF2B5EF4-FFF2-40B4-BE49-F238E27FC236}">
-                <a16:creationId xmlns:a16="http://schemas.microsoft.com/office/drawing/2014/main" id="{8A1A5676-07A6-4D68-A40B-84378C80F9A3}"/>
-              </a:ext>
-            </a:extLst>
-          </p:cNvPr>
-          <p:cNvSpPr>
-            <a:spLocks noGrp="1"/>
-          </p:cNvSpPr>
-          <p:nvPr>
-            <p:ph type="title"/>
-          </p:nvPr>
-        </p:nvSpPr>
-        <p:spPr/>
-        <p:txBody>
-          <a:bodyPr/>
-          <a:lstStyle/>
-          <a:p>
-            <a:r>
-              <a:rPr lang="en-US"/>
-              <a:t>Additional Heuristics</a:t>
-            </a:r>
-          </a:p>
-        </p:txBody>
-      </p:sp>
-      <p:sp>
-        <p:nvSpPr>
-          <p:cNvPr id="3" name="Content Placeholder 2">
-            <a:extLst>
-              <a:ext uri="{FF2B5EF4-FFF2-40B4-BE49-F238E27FC236}">
-                <a16:creationId xmlns:a16="http://schemas.microsoft.com/office/drawing/2014/main" id="{7DE38775-71F4-4534-9E5A-AAA9F8602686}"/>
-              </a:ext>
-            </a:extLst>
-          </p:cNvPr>
-          <p:cNvSpPr>
-            <a:spLocks noGrp="1"/>
-          </p:cNvSpPr>
-          <p:nvPr>
-            <p:ph idx="1"/>
-          </p:nvPr>
-        </p:nvSpPr>
-        <p:spPr>
-          <a:xfrm>
-            <a:off x="56608" y="816175"/>
-            <a:ext cx="3817674" cy="2009363"/>
-          </a:xfrm>
-        </p:spPr>
-        <p:txBody>
-          <a:bodyPr>
-            <a:normAutofit/>
-          </a:bodyPr>
-          <a:lstStyle/>
-          <a:p>
-            <a:r>
-              <a:rPr lang="en-US" sz="2000"/>
-              <a:t>Use the design heuristics from C11 to size the following pieces of equipment:</a:t>
-            </a:r>
-          </a:p>
-          <a:p>
-            <a:pPr lvl="1"/>
-            <a:r>
-              <a:rPr lang="en-US"/>
-              <a:t>V-102</a:t>
-            </a:r>
-          </a:p>
-          <a:p>
-            <a:pPr lvl="1"/>
-            <a:r>
-              <a:rPr lang="en-US"/>
-              <a:t>E-105</a:t>
-            </a:r>
-          </a:p>
-          <a:p>
-            <a:pPr lvl="1"/>
-            <a:r>
-              <a:rPr lang="en-US"/>
-              <a:t>T-101</a:t>
-            </a:r>
-          </a:p>
-        </p:txBody>
-      </p:sp>
-      <p:pic>
-        <p:nvPicPr>
-          <p:cNvPr id="6" name="Picture 5" descr="A picture containing text, receipt&#10;&#10;Description automatically generated">
-            <a:extLst>
-              <a:ext uri="{FF2B5EF4-FFF2-40B4-BE49-F238E27FC236}">
-                <a16:creationId xmlns:a16="http://schemas.microsoft.com/office/drawing/2014/main" id="{8B6F4343-E474-4DBB-87C6-55AE3CF33B71}"/>
-              </a:ext>
-            </a:extLst>
-          </p:cNvPr>
-          <p:cNvPicPr>
-            <a:picLocks noChangeAspect="1"/>
-          </p:cNvPicPr>
-          <p:nvPr/>
-        </p:nvPicPr>
-        <p:blipFill rotWithShape="1">
-          <a:blip r:embed="rId2">
-            <a:extLst>
-              <a:ext uri="{28A0092B-C50C-407E-A947-70E740481C1C}">
-                <a14:useLocalDpi xmlns:a14="http://schemas.microsoft.com/office/drawing/2010/main" val="0"/>
-              </a:ext>
-            </a:extLst>
-          </a:blip>
-          <a:srcRect b="12922"/>
-          <a:stretch/>
-        </p:blipFill>
-        <p:spPr>
-          <a:xfrm>
-            <a:off x="4031361" y="1040077"/>
-            <a:ext cx="4305938" cy="5486400"/>
-          </a:xfrm>
-          <a:prstGeom prst="rect">
-            <a:avLst/>
-          </a:prstGeom>
-        </p:spPr>
-      </p:pic>
-    </p:spTree>
-    <p:extLst>
-      <p:ext uri="{BB962C8B-B14F-4D97-AF65-F5344CB8AC3E}">
-        <p14:creationId xmlns:p14="http://schemas.microsoft.com/office/powerpoint/2010/main" val="4191263778"/>
-      </p:ext>
-    </p:extLst>
-  </p:cSld>
-  <p:clrMapOvr>
-    <a:masterClrMapping/>
-  </p:clrMapOvr>
-</p:sld>
-</file>
-
-<file path=ppt/slides/slide2.xml><?xml version="1.0" encoding="utf-8"?>
 <p:sld xmlns:a="http://schemas.openxmlformats.org/drawingml/2006/main" xmlns:r="http://schemas.openxmlformats.org/officeDocument/2006/relationships" xmlns:p="http://schemas.openxmlformats.org/presentationml/2006/main" show="0">
   <p:cSld>
     <p:spTree>
@@ -4753,7 +4228,7 @@
           <p:cNvPr id="2" name="Title 1">
             <a:extLst>
               <a:ext uri="{FF2B5EF4-FFF2-40B4-BE49-F238E27FC236}">
-                <a16:creationId xmlns:a16="http://schemas.microsoft.com/office/drawing/2014/main" id="{10857957-FBF3-4C44-943E-5EA8EB0F6105}"/>
+                <a16:creationId xmlns:a16="http://schemas.microsoft.com/office/drawing/2014/main" id="{773BE34D-B7F9-46A1-928B-E3954D878E86}"/>
               </a:ext>
             </a:extLst>
           </p:cNvPr>
@@ -4771,54 +4246,75 @@
           <a:p>
             <a:r>
               <a:rPr lang="en-US"/>
-              <a:t>What you will learn</a:t>
-            </a:r>
-          </a:p>
-        </p:txBody>
-      </p:sp>
-      <p:sp>
-        <p:nvSpPr>
-          <p:cNvPr id="10" name="TextBox 9">
+              <a:t>An example</a:t>
+            </a:r>
+          </a:p>
+        </p:txBody>
+      </p:sp>
+      <p:sp>
+        <p:nvSpPr>
+          <p:cNvPr id="3" name="Content Placeholder 2">
             <a:extLst>
               <a:ext uri="{FF2B5EF4-FFF2-40B4-BE49-F238E27FC236}">
-                <a16:creationId xmlns:a16="http://schemas.microsoft.com/office/drawing/2014/main" id="{3ADB12CB-97FF-4817-A327-21E3713F5A9B}"/>
+                <a16:creationId xmlns:a16="http://schemas.microsoft.com/office/drawing/2014/main" id="{B6BBBE54-2734-4858-BC37-0D2D6281D997}"/>
               </a:ext>
             </a:extLst>
           </p:cNvPr>
-          <p:cNvSpPr txBox="1"/>
-          <p:nvPr/>
-        </p:nvSpPr>
-        <p:spPr>
-          <a:xfrm>
-            <a:off x="303711" y="1205405"/>
-            <a:ext cx="6004324" cy="923330"/>
-          </a:xfrm>
-          <a:prstGeom prst="rect">
-            <a:avLst/>
-          </a:prstGeom>
-          <a:noFill/>
-        </p:spPr>
-        <p:txBody>
-          <a:bodyPr wrap="square" rtlCol="0">
-            <a:spAutoFit/>
+          <p:cNvSpPr>
+            <a:spLocks noGrp="1"/>
+          </p:cNvSpPr>
+          <p:nvPr>
+            <p:ph idx="1"/>
+          </p:nvPr>
+        </p:nvSpPr>
+        <p:spPr>
+          <a:xfrm>
+            <a:off x="277352" y="927968"/>
+            <a:ext cx="8740971" cy="5602841"/>
+          </a:xfrm>
+        </p:spPr>
+        <p:txBody>
+          <a:bodyPr>
+            <a:noAutofit/>
           </a:bodyPr>
           <a:lstStyle/>
           <a:p>
-            <a:pPr marL="285750" indent="-285750">
-              <a:buFont typeface="Arial" panose="020B0604020202020204" pitchFamily="34" charset="0"/>
-              <a:buChar char="•"/>
+            <a:pPr marL="0" indent="0">
+              <a:buNone/>
             </a:pPr>
             <a:r>
-              <a:rPr lang="en-US"/>
-              <a:t>Experience-based </a:t>
-            </a:r>
-            <a:r>
-              <a:rPr lang="en-US" b="1"/>
-              <a:t>heuristics</a:t>
-            </a:r>
-            <a:r>
-              <a:rPr lang="en-US"/>
-              <a:t> that can be used to estimate unknown parameters and validate calculated parameters used to design a chemical process.</a:t>
+              <a:rPr lang="en-US" sz="2000"/>
+              <a:t>You are given an assignment that involves writing a report that is to be completed and presented in two weeks. You work diligently and feel confident you have come up with a respectable solution. You present the written report personally to your director, who asks you to summarize only your final conclusions. Immediately after you provide this information, your boss declares that “your results must be wrong” and returns your report unopened and unread.</a:t>
+            </a:r>
+          </a:p>
+          <a:p>
+            <a:pPr marL="0" indent="0">
+              <a:buNone/>
+            </a:pPr>
+            <a:endParaRPr lang="en-US" sz="2000"/>
+          </a:p>
+          <a:p>
+            <a:pPr marL="0" indent="0">
+              <a:buNone/>
+            </a:pPr>
+            <a:r>
+              <a:rPr lang="en-US" sz="2000"/>
+              <a:t>You return to your desk angry. Your comprehensive and well-written report was not even opened and read. Your boss did not tell you what was wrong, and you did not receive any “partial credit” for all your work. After a while, you cool off and review your report. You find that you had made a “simple” error, causing your answer to be off by an order of magnitude. You correct the error and turn in a revised report.</a:t>
+            </a:r>
+          </a:p>
+          <a:p>
+            <a:pPr marL="0" indent="0">
+              <a:buNone/>
+            </a:pPr>
+            <a:endParaRPr lang="en-US" sz="2000"/>
+          </a:p>
+          <a:p>
+            <a:pPr marL="0" indent="0">
+              <a:buNone/>
+            </a:pPr>
+            <a:r>
+              <a:rPr lang="en-US" sz="2000"/>
+              <a:t>What remains is the nagging question, “How could your boss know you made an error without having reviewed your report or asked any questions?”</a:t>
             </a:r>
           </a:p>
         </p:txBody>
@@ -4826,7 +4322,7 @@
     </p:spTree>
     <p:extLst>
       <p:ext uri="{BB962C8B-B14F-4D97-AF65-F5344CB8AC3E}">
-        <p14:creationId xmlns:p14="http://schemas.microsoft.com/office/powerpoint/2010/main" val="1957867484"/>
+        <p14:creationId xmlns:p14="http://schemas.microsoft.com/office/powerpoint/2010/main" val="3081160866"/>
       </p:ext>
     </p:extLst>
   </p:cSld>
@@ -4836,352 +4332,7 @@
 </p:sld>
 </file>
 
-<file path=ppt/slides/slide3.xml><?xml version="1.0" encoding="utf-8"?>
-<p:sld xmlns:a="http://schemas.openxmlformats.org/drawingml/2006/main" xmlns:r="http://schemas.openxmlformats.org/officeDocument/2006/relationships" xmlns:p="http://schemas.openxmlformats.org/presentationml/2006/main">
-  <p:cSld>
-    <p:spTree>
-      <p:nvGrpSpPr>
-        <p:cNvPr id="1" name=""/>
-        <p:cNvGrpSpPr/>
-        <p:nvPr/>
-      </p:nvGrpSpPr>
-      <p:grpSpPr>
-        <a:xfrm>
-          <a:off x="0" y="0"/>
-          <a:ext cx="0" cy="0"/>
-          <a:chOff x="0" y="0"/>
-          <a:chExt cx="0" cy="0"/>
-        </a:xfrm>
-      </p:grpSpPr>
-      <p:sp>
-        <p:nvSpPr>
-          <p:cNvPr id="2" name="Title 1">
-            <a:extLst>
-              <a:ext uri="{FF2B5EF4-FFF2-40B4-BE49-F238E27FC236}">
-                <a16:creationId xmlns:a16="http://schemas.microsoft.com/office/drawing/2014/main" id="{773BE34D-B7F9-46A1-928B-E3954D878E86}"/>
-              </a:ext>
-            </a:extLst>
-          </p:cNvPr>
-          <p:cNvSpPr>
-            <a:spLocks noGrp="1"/>
-          </p:cNvSpPr>
-          <p:nvPr>
-            <p:ph type="title"/>
-          </p:nvPr>
-        </p:nvSpPr>
-        <p:spPr/>
-        <p:txBody>
-          <a:bodyPr/>
-          <a:lstStyle/>
-          <a:p>
-            <a:r>
-              <a:rPr lang="en-US"/>
-              <a:t>What is a heuristic?</a:t>
-            </a:r>
-          </a:p>
-        </p:txBody>
-      </p:sp>
-      <p:sp>
-        <p:nvSpPr>
-          <p:cNvPr id="3" name="Content Placeholder 2">
-            <a:extLst>
-              <a:ext uri="{FF2B5EF4-FFF2-40B4-BE49-F238E27FC236}">
-                <a16:creationId xmlns:a16="http://schemas.microsoft.com/office/drawing/2014/main" id="{B6BBBE54-2734-4858-BC37-0D2D6281D997}"/>
-              </a:ext>
-            </a:extLst>
-          </p:cNvPr>
-          <p:cNvSpPr>
-            <a:spLocks noGrp="1"/>
-          </p:cNvSpPr>
-          <p:nvPr>
-            <p:ph idx="1"/>
-          </p:nvPr>
-        </p:nvSpPr>
-        <p:spPr>
-          <a:xfrm>
-            <a:off x="663319" y="1153318"/>
-            <a:ext cx="7886700" cy="4551363"/>
-          </a:xfrm>
-        </p:spPr>
-        <p:txBody>
-          <a:bodyPr>
-            <a:normAutofit/>
-          </a:bodyPr>
-          <a:lstStyle/>
-          <a:p>
-            <a:pPr marL="0" indent="0">
-              <a:buNone/>
-            </a:pPr>
-            <a:r>
-              <a:rPr lang="en-US"/>
-              <a:t>A </a:t>
-            </a:r>
-            <a:r>
-              <a:rPr lang="en-US" b="1" i="1"/>
-              <a:t>heuristic </a:t>
-            </a:r>
-            <a:r>
-              <a:rPr lang="en-US"/>
-              <a:t>is an experience-based shortcut calculation method or guideline useful for</a:t>
-            </a:r>
-          </a:p>
-          <a:p>
-            <a:pPr marL="0" indent="0">
-              <a:buNone/>
-            </a:pPr>
-            <a:endParaRPr lang="en-US"/>
-          </a:p>
-          <a:p>
-            <a:r>
-              <a:rPr lang="en-US" sz="1900" b="1"/>
-              <a:t>Checking</a:t>
-            </a:r>
-            <a:r>
-              <a:rPr lang="en-US" sz="1900"/>
-              <a:t> new process designs</a:t>
-            </a:r>
-          </a:p>
-          <a:p>
-            <a:r>
-              <a:rPr lang="en-US" sz="1900"/>
-              <a:t>Providing equipment size and performance </a:t>
-            </a:r>
-            <a:r>
-              <a:rPr lang="en-US" sz="1900" b="1"/>
-              <a:t>estimates</a:t>
-            </a:r>
-          </a:p>
-          <a:p>
-            <a:r>
-              <a:rPr lang="en-US" sz="1900"/>
-              <a:t>Helping </a:t>
-            </a:r>
-            <a:r>
-              <a:rPr lang="en-US" sz="1900" b="1"/>
-              <a:t>troubleshoot</a:t>
-            </a:r>
-            <a:r>
-              <a:rPr lang="en-US" sz="1900"/>
-              <a:t> problems with operating systems</a:t>
-            </a:r>
-          </a:p>
-          <a:p>
-            <a:r>
-              <a:rPr lang="en-US" sz="1900" b="1"/>
-              <a:t>Verifying</a:t>
-            </a:r>
-            <a:r>
-              <a:rPr lang="en-US" sz="1900"/>
-              <a:t> that the results of computer calculations and simulations are reasonable</a:t>
-            </a:r>
-          </a:p>
-          <a:p>
-            <a:r>
-              <a:rPr lang="en-US" sz="1900"/>
-              <a:t>Providing </a:t>
-            </a:r>
-            <a:r>
-              <a:rPr lang="en-US" sz="1900" b="1"/>
-              <a:t>reasonable initial values </a:t>
-            </a:r>
-            <a:r>
-              <a:rPr lang="en-US" sz="1900"/>
-              <a:t>for input into a process simulator required to obtain program convergence</a:t>
-            </a:r>
-          </a:p>
-          <a:p>
-            <a:r>
-              <a:rPr lang="en-US" sz="1900"/>
-              <a:t>Obtaining </a:t>
-            </a:r>
-            <a:r>
-              <a:rPr lang="en-US" sz="1900" b="1"/>
-              <a:t>approximate costs </a:t>
-            </a:r>
-            <a:r>
-              <a:rPr lang="en-US" sz="1900"/>
-              <a:t>for process units</a:t>
-            </a:r>
-          </a:p>
-          <a:p>
-            <a:r>
-              <a:rPr lang="en-US" sz="1900"/>
-              <a:t>Developing </a:t>
-            </a:r>
-            <a:r>
-              <a:rPr lang="en-US" sz="1900" b="1"/>
-              <a:t>preliminary</a:t>
-            </a:r>
-            <a:r>
-              <a:rPr lang="en-US" sz="1900"/>
-              <a:t> process layouts</a:t>
-            </a:r>
-          </a:p>
-          <a:p>
-            <a:endParaRPr lang="en-US"/>
-          </a:p>
-        </p:txBody>
-      </p:sp>
-    </p:spTree>
-    <p:extLst>
-      <p:ext uri="{BB962C8B-B14F-4D97-AF65-F5344CB8AC3E}">
-        <p14:creationId xmlns:p14="http://schemas.microsoft.com/office/powerpoint/2010/main" val="1563412917"/>
-      </p:ext>
-    </p:extLst>
-  </p:cSld>
-  <p:clrMapOvr>
-    <a:masterClrMapping/>
-  </p:clrMapOvr>
-</p:sld>
-</file>
-
-<file path=ppt/slides/slide4.xml><?xml version="1.0" encoding="utf-8"?>
-<p:sld xmlns:a="http://schemas.openxmlformats.org/drawingml/2006/main" xmlns:r="http://schemas.openxmlformats.org/officeDocument/2006/relationships" xmlns:p="http://schemas.openxmlformats.org/presentationml/2006/main">
-  <p:cSld>
-    <p:spTree>
-      <p:nvGrpSpPr>
-        <p:cNvPr id="1" name=""/>
-        <p:cNvGrpSpPr/>
-        <p:nvPr/>
-      </p:nvGrpSpPr>
-      <p:grpSpPr>
-        <a:xfrm>
-          <a:off x="0" y="0"/>
-          <a:ext cx="0" cy="0"/>
-          <a:chOff x="0" y="0"/>
-          <a:chExt cx="0" cy="0"/>
-        </a:xfrm>
-      </p:grpSpPr>
-      <p:sp>
-        <p:nvSpPr>
-          <p:cNvPr id="2" name="Title 1">
-            <a:extLst>
-              <a:ext uri="{FF2B5EF4-FFF2-40B4-BE49-F238E27FC236}">
-                <a16:creationId xmlns:a16="http://schemas.microsoft.com/office/drawing/2014/main" id="{773BE34D-B7F9-46A1-928B-E3954D878E86}"/>
-              </a:ext>
-            </a:extLst>
-          </p:cNvPr>
-          <p:cNvSpPr>
-            <a:spLocks noGrp="1"/>
-          </p:cNvSpPr>
-          <p:nvPr>
-            <p:ph type="title"/>
-          </p:nvPr>
-        </p:nvSpPr>
-        <p:spPr/>
-        <p:txBody>
-          <a:bodyPr/>
-          <a:lstStyle/>
-          <a:p>
-            <a:r>
-              <a:rPr lang="en-US"/>
-              <a:t>What is a heuristic?</a:t>
-            </a:r>
-          </a:p>
-        </p:txBody>
-      </p:sp>
-      <p:sp>
-        <p:nvSpPr>
-          <p:cNvPr id="3" name="Content Placeholder 2">
-            <a:extLst>
-              <a:ext uri="{FF2B5EF4-FFF2-40B4-BE49-F238E27FC236}">
-                <a16:creationId xmlns:a16="http://schemas.microsoft.com/office/drawing/2014/main" id="{B6BBBE54-2734-4858-BC37-0D2D6281D997}"/>
-              </a:ext>
-            </a:extLst>
-          </p:cNvPr>
-          <p:cNvSpPr>
-            <a:spLocks noGrp="1"/>
-          </p:cNvSpPr>
-          <p:nvPr>
-            <p:ph idx="1"/>
-          </p:nvPr>
-        </p:nvSpPr>
-        <p:spPr>
-          <a:xfrm>
-            <a:off x="663319" y="1153318"/>
-            <a:ext cx="7886700" cy="4551363"/>
-          </a:xfrm>
-        </p:spPr>
-        <p:txBody>
-          <a:bodyPr>
-            <a:normAutofit/>
-          </a:bodyPr>
-          <a:lstStyle/>
-          <a:p>
-            <a:pPr marL="0" indent="0">
-              <a:buNone/>
-            </a:pPr>
-            <a:r>
-              <a:rPr lang="en-US"/>
-              <a:t>A </a:t>
-            </a:r>
-            <a:r>
-              <a:rPr lang="en-US" b="1" i="1"/>
-              <a:t>heuristic </a:t>
-            </a:r>
-            <a:r>
-              <a:rPr lang="en-US"/>
-              <a:t>is an experience-based shortcut calculation method or guideline:</a:t>
-            </a:r>
-          </a:p>
-          <a:p>
-            <a:pPr marL="0" indent="0">
-              <a:buNone/>
-            </a:pPr>
-            <a:endParaRPr lang="en-US"/>
-          </a:p>
-          <a:p>
-            <a:pPr marL="457200" indent="-457200">
-              <a:buAutoNum type="arabicPeriod"/>
-            </a:pPr>
-            <a:r>
-              <a:rPr lang="en-US"/>
-              <a:t>A heuristic does not guarantee a solution.</a:t>
-            </a:r>
-          </a:p>
-          <a:p>
-            <a:pPr marL="457200" indent="-457200">
-              <a:buAutoNum type="arabicPeriod"/>
-            </a:pPr>
-            <a:r>
-              <a:rPr lang="en-US"/>
-              <a:t>It may contradict other heuristics</a:t>
-            </a:r>
-          </a:p>
-          <a:p>
-            <a:pPr marL="457200" indent="-457200">
-              <a:buAutoNum type="arabicPeriod"/>
-            </a:pPr>
-            <a:r>
-              <a:rPr lang="en-US"/>
-              <a:t>It can reduce the time to solve a problem.</a:t>
-            </a:r>
-          </a:p>
-          <a:p>
-            <a:pPr marL="457200" indent="-457200">
-              <a:buAutoNum type="arabicPeriod"/>
-            </a:pPr>
-            <a:r>
-              <a:rPr lang="en-US"/>
-              <a:t>Its acceptance depends on the immediate context instead of an absolute standard.</a:t>
-            </a:r>
-          </a:p>
-        </p:txBody>
-      </p:sp>
-    </p:spTree>
-    <p:extLst>
-      <p:ext uri="{BB962C8B-B14F-4D97-AF65-F5344CB8AC3E}">
-        <p14:creationId xmlns:p14="http://schemas.microsoft.com/office/powerpoint/2010/main" val="368098642"/>
-      </p:ext>
-    </p:extLst>
-  </p:cSld>
-  <p:clrMapOvr>
-    <a:masterClrMapping/>
-  </p:clrMapOvr>
-</p:sld>
-</file>
-
-<file path=ppt/slides/slide5.xml><?xml version="1.0" encoding="utf-8"?>
+<file path=ppt/slides/slide15.xml><?xml version="1.0" encoding="utf-8"?>
 <p:sld xmlns:a="http://schemas.openxmlformats.org/drawingml/2006/main" xmlns:r="http://schemas.openxmlformats.org/officeDocument/2006/relationships" xmlns:p="http://schemas.openxmlformats.org/presentationml/2006/main" show="0">
   <p:cSld>
     <p:spTree>
@@ -5259,132 +4410,6 @@
             </a:pPr>
             <a:r>
               <a:rPr lang="en-US" sz="2000"/>
-              <a:t>You are given an assignment that involves writing a report that is to be completed and presented in two weeks. You work diligently and feel confident you have come up with a respectable solution. You present the written report personally to your director, who asks you to summarize only your final conclusions. Immediately after you provide this information, your boss declares that “your results must be wrong” and returns your report unopened and unread.</a:t>
-            </a:r>
-          </a:p>
-          <a:p>
-            <a:pPr marL="0" indent="0">
-              <a:buNone/>
-            </a:pPr>
-            <a:endParaRPr lang="en-US" sz="2000"/>
-          </a:p>
-          <a:p>
-            <a:pPr marL="0" indent="0">
-              <a:buNone/>
-            </a:pPr>
-            <a:r>
-              <a:rPr lang="en-US" sz="2000"/>
-              <a:t>You return to your desk angry. Your comprehensive and well-written report was not even opened and read. Your boss did not tell you what was wrong, and you did not receive any “partial credit” for all your work. After a while, you cool off and review your report. You find that you had made a “simple” error, causing your answer to be off by an order of magnitude. You correct the error and turn in a revised report.</a:t>
-            </a:r>
-          </a:p>
-          <a:p>
-            <a:pPr marL="0" indent="0">
-              <a:buNone/>
-            </a:pPr>
-            <a:endParaRPr lang="en-US" sz="2000"/>
-          </a:p>
-          <a:p>
-            <a:pPr marL="0" indent="0">
-              <a:buNone/>
-            </a:pPr>
-            <a:r>
-              <a:rPr lang="en-US" sz="2000"/>
-              <a:t>What remains is the nagging question, “How could your boss know you made an error without having reviewed your report or asked any questions?”</a:t>
-            </a:r>
-          </a:p>
-        </p:txBody>
-      </p:sp>
-    </p:spTree>
-    <p:extLst>
-      <p:ext uri="{BB962C8B-B14F-4D97-AF65-F5344CB8AC3E}">
-        <p14:creationId xmlns:p14="http://schemas.microsoft.com/office/powerpoint/2010/main" val="3081160866"/>
-      </p:ext>
-    </p:extLst>
-  </p:cSld>
-  <p:clrMapOvr>
-    <a:masterClrMapping/>
-  </p:clrMapOvr>
-</p:sld>
-</file>
-
-<file path=ppt/slides/slide6.xml><?xml version="1.0" encoding="utf-8"?>
-<p:sld xmlns:a="http://schemas.openxmlformats.org/drawingml/2006/main" xmlns:r="http://schemas.openxmlformats.org/officeDocument/2006/relationships" xmlns:p="http://schemas.openxmlformats.org/presentationml/2006/main" show="0">
-  <p:cSld>
-    <p:spTree>
-      <p:nvGrpSpPr>
-        <p:cNvPr id="1" name=""/>
-        <p:cNvGrpSpPr/>
-        <p:nvPr/>
-      </p:nvGrpSpPr>
-      <p:grpSpPr>
-        <a:xfrm>
-          <a:off x="0" y="0"/>
-          <a:ext cx="0" cy="0"/>
-          <a:chOff x="0" y="0"/>
-          <a:chExt cx="0" cy="0"/>
-        </a:xfrm>
-      </p:grpSpPr>
-      <p:sp>
-        <p:nvSpPr>
-          <p:cNvPr id="2" name="Title 1">
-            <a:extLst>
-              <a:ext uri="{FF2B5EF4-FFF2-40B4-BE49-F238E27FC236}">
-                <a16:creationId xmlns:a16="http://schemas.microsoft.com/office/drawing/2014/main" id="{773BE34D-B7F9-46A1-928B-E3954D878E86}"/>
-              </a:ext>
-            </a:extLst>
-          </p:cNvPr>
-          <p:cNvSpPr>
-            <a:spLocks noGrp="1"/>
-          </p:cNvSpPr>
-          <p:nvPr>
-            <p:ph type="title"/>
-          </p:nvPr>
-        </p:nvSpPr>
-        <p:spPr/>
-        <p:txBody>
-          <a:bodyPr/>
-          <a:lstStyle/>
-          <a:p>
-            <a:r>
-              <a:rPr lang="en-US"/>
-              <a:t>An example</a:t>
-            </a:r>
-          </a:p>
-        </p:txBody>
-      </p:sp>
-      <p:sp>
-        <p:nvSpPr>
-          <p:cNvPr id="3" name="Content Placeholder 2">
-            <a:extLst>
-              <a:ext uri="{FF2B5EF4-FFF2-40B4-BE49-F238E27FC236}">
-                <a16:creationId xmlns:a16="http://schemas.microsoft.com/office/drawing/2014/main" id="{B6BBBE54-2734-4858-BC37-0D2D6281D997}"/>
-              </a:ext>
-            </a:extLst>
-          </p:cNvPr>
-          <p:cNvSpPr>
-            <a:spLocks noGrp="1"/>
-          </p:cNvSpPr>
-          <p:nvPr>
-            <p:ph idx="1"/>
-          </p:nvPr>
-        </p:nvSpPr>
-        <p:spPr>
-          <a:xfrm>
-            <a:off x="277352" y="927968"/>
-            <a:ext cx="8740971" cy="5602841"/>
-          </a:xfrm>
-        </p:spPr>
-        <p:txBody>
-          <a:bodyPr>
-            <a:noAutofit/>
-          </a:bodyPr>
-          <a:lstStyle/>
-          <a:p>
-            <a:pPr marL="0" indent="0">
-              <a:buNone/>
-            </a:pPr>
-            <a:r>
-              <a:rPr lang="en-US" sz="2000"/>
               <a:t>Before submitting your report, you apply a heuristic that highlights an inconsistency in your initial results. You then review your calculations, find the error, and make corrections before submitting your report. Consider two possible responses:</a:t>
             </a:r>
           </a:p>
@@ -5448,7 +4473,7 @@
 </p:sld>
 </file>
 
-<file path=ppt/slides/slide7.xml><?xml version="1.0" encoding="utf-8"?>
+<file path=ppt/slides/slide16.xml><?xml version="1.0" encoding="utf-8"?>
 <p:sld xmlns:a="http://schemas.openxmlformats.org/drawingml/2006/main" xmlns:r="http://schemas.openxmlformats.org/officeDocument/2006/relationships" xmlns:p="http://schemas.openxmlformats.org/presentationml/2006/main">
   <p:cSld>
     <p:spTree>
@@ -5862,6 +4887,1759 @@
 </p:sld>
 </file>
 
+<file path=ppt/slides/slide17.xml><?xml version="1.0" encoding="utf-8"?>
+<p:sld xmlns:a="http://schemas.openxmlformats.org/drawingml/2006/main" xmlns:r="http://schemas.openxmlformats.org/officeDocument/2006/relationships" xmlns:p="http://schemas.openxmlformats.org/presentationml/2006/main">
+  <p:cSld>
+    <p:spTree>
+      <p:nvGrpSpPr>
+        <p:cNvPr id="1" name=""/>
+        <p:cNvGrpSpPr/>
+        <p:nvPr/>
+      </p:nvGrpSpPr>
+      <p:grpSpPr>
+        <a:xfrm>
+          <a:off x="0" y="0"/>
+          <a:ext cx="0" cy="0"/>
+          <a:chOff x="0" y="0"/>
+          <a:chExt cx="0" cy="0"/>
+        </a:xfrm>
+      </p:grpSpPr>
+      <p:sp>
+        <p:nvSpPr>
+          <p:cNvPr id="2" name="Title 1">
+            <a:extLst>
+              <a:ext uri="{FF2B5EF4-FFF2-40B4-BE49-F238E27FC236}">
+                <a16:creationId xmlns:a16="http://schemas.microsoft.com/office/drawing/2014/main" id="{39D2C4B5-84BC-48B5-842C-A31C61D310BB}"/>
+              </a:ext>
+            </a:extLst>
+          </p:cNvPr>
+          <p:cNvSpPr>
+            <a:spLocks noGrp="1"/>
+          </p:cNvSpPr>
+          <p:nvPr>
+            <p:ph type="title"/>
+          </p:nvPr>
+        </p:nvSpPr>
+        <p:spPr/>
+        <p:txBody>
+          <a:bodyPr/>
+          <a:lstStyle/>
+          <a:p>
+            <a:r>
+              <a:rPr lang="en-US"/>
+              <a:t>Separation Heuristics</a:t>
+            </a:r>
+          </a:p>
+        </p:txBody>
+      </p:sp>
+      <p:pic>
+        <p:nvPicPr>
+          <p:cNvPr id="5" name="Picture 4" descr="A screenshot of text&#10;&#10;Description automatically generated">
+            <a:extLst>
+              <a:ext uri="{FF2B5EF4-FFF2-40B4-BE49-F238E27FC236}">
+                <a16:creationId xmlns:a16="http://schemas.microsoft.com/office/drawing/2014/main" id="{25D40D20-3719-4ED9-89FA-C7A0EE7EAD45}"/>
+              </a:ext>
+            </a:extLst>
+          </p:cNvPr>
+          <p:cNvPicPr>
+            <a:picLocks noChangeAspect="1"/>
+          </p:cNvPicPr>
+          <p:nvPr/>
+        </p:nvPicPr>
+        <p:blipFill rotWithShape="1">
+          <a:blip r:embed="rId2">
+            <a:extLst>
+              <a:ext uri="{28A0092B-C50C-407E-A947-70E740481C1C}">
+                <a14:useLocalDpi xmlns:a14="http://schemas.microsoft.com/office/drawing/2010/main" val="0"/>
+              </a:ext>
+            </a:extLst>
+          </a:blip>
+          <a:srcRect t="1328" b="15765"/>
+          <a:stretch/>
+        </p:blipFill>
+        <p:spPr>
+          <a:xfrm>
+            <a:off x="1249331" y="940402"/>
+            <a:ext cx="5735271" cy="5685748"/>
+          </a:xfrm>
+          <a:prstGeom prst="rect">
+            <a:avLst/>
+          </a:prstGeom>
+        </p:spPr>
+      </p:pic>
+    </p:spTree>
+    <p:extLst>
+      <p:ext uri="{BB962C8B-B14F-4D97-AF65-F5344CB8AC3E}">
+        <p14:creationId xmlns:p14="http://schemas.microsoft.com/office/powerpoint/2010/main" val="1027139185"/>
+      </p:ext>
+    </p:extLst>
+  </p:cSld>
+  <p:clrMapOvr>
+    <a:masterClrMapping/>
+  </p:clrMapOvr>
+</p:sld>
+</file>
+
+<file path=ppt/slides/slide18.xml><?xml version="1.0" encoding="utf-8"?>
+<p:sld xmlns:a="http://schemas.openxmlformats.org/drawingml/2006/main" xmlns:r="http://schemas.openxmlformats.org/officeDocument/2006/relationships" xmlns:p="http://schemas.openxmlformats.org/presentationml/2006/main">
+  <p:cSld>
+    <p:spTree>
+      <p:nvGrpSpPr>
+        <p:cNvPr id="1" name=""/>
+        <p:cNvGrpSpPr/>
+        <p:nvPr/>
+      </p:nvGrpSpPr>
+      <p:grpSpPr>
+        <a:xfrm>
+          <a:off x="0" y="0"/>
+          <a:ext cx="0" cy="0"/>
+          <a:chOff x="0" y="0"/>
+          <a:chExt cx="0" cy="0"/>
+        </a:xfrm>
+      </p:grpSpPr>
+      <p:sp>
+        <p:nvSpPr>
+          <p:cNvPr id="2" name="Title 1">
+            <a:extLst>
+              <a:ext uri="{FF2B5EF4-FFF2-40B4-BE49-F238E27FC236}">
+                <a16:creationId xmlns:a16="http://schemas.microsoft.com/office/drawing/2014/main" id="{F3549CF1-2D79-4959-85C0-A1A2F11D5AEE}"/>
+              </a:ext>
+            </a:extLst>
+          </p:cNvPr>
+          <p:cNvSpPr>
+            <a:spLocks noGrp="1"/>
+          </p:cNvSpPr>
+          <p:nvPr>
+            <p:ph type="title"/>
+          </p:nvPr>
+        </p:nvSpPr>
+        <p:spPr/>
+        <p:txBody>
+          <a:bodyPr/>
+          <a:lstStyle/>
+          <a:p>
+            <a:r>
+              <a:rPr lang="en-US"/>
+              <a:t>Alternate separations units</a:t>
+            </a:r>
+          </a:p>
+        </p:txBody>
+      </p:sp>
+      <p:pic>
+        <p:nvPicPr>
+          <p:cNvPr id="8" name="Content Placeholder 7" descr="A close up of a map&#10;&#10;Description automatically generated">
+            <a:extLst>
+              <a:ext uri="{FF2B5EF4-FFF2-40B4-BE49-F238E27FC236}">
+                <a16:creationId xmlns:a16="http://schemas.microsoft.com/office/drawing/2014/main" id="{BFC5E142-98E6-4FCE-92F7-64F9B5538114}"/>
+              </a:ext>
+            </a:extLst>
+          </p:cNvPr>
+          <p:cNvPicPr>
+            <a:picLocks noGrp="1" noChangeAspect="1"/>
+          </p:cNvPicPr>
+          <p:nvPr>
+            <p:ph idx="1"/>
+          </p:nvPr>
+        </p:nvPicPr>
+        <p:blipFill rotWithShape="1">
+          <a:blip r:embed="rId2">
+            <a:extLst>
+              <a:ext uri="{28A0092B-C50C-407E-A947-70E740481C1C}">
+                <a14:useLocalDpi xmlns:a14="http://schemas.microsoft.com/office/drawing/2010/main" val="0"/>
+              </a:ext>
+            </a:extLst>
+          </a:blip>
+          <a:srcRect l="733" r="2135" b="14066"/>
+          <a:stretch/>
+        </p:blipFill>
+        <p:spPr>
+          <a:xfrm>
+            <a:off x="3293573" y="1224218"/>
+            <a:ext cx="5486400" cy="5104664"/>
+          </a:xfrm>
+        </p:spPr>
+      </p:pic>
+      <p:sp>
+        <p:nvSpPr>
+          <p:cNvPr id="9" name="TextBox 8">
+            <a:extLst>
+              <a:ext uri="{FF2B5EF4-FFF2-40B4-BE49-F238E27FC236}">
+                <a16:creationId xmlns:a16="http://schemas.microsoft.com/office/drawing/2014/main" id="{4AB7A9A9-4358-475E-B241-34B20A0D35E0}"/>
+              </a:ext>
+            </a:extLst>
+          </p:cNvPr>
+          <p:cNvSpPr txBox="1"/>
+          <p:nvPr/>
+        </p:nvSpPr>
+        <p:spPr>
+          <a:xfrm>
+            <a:off x="65005" y="1950142"/>
+            <a:ext cx="3341243" cy="3139321"/>
+          </a:xfrm>
+          <a:prstGeom prst="rect">
+            <a:avLst/>
+          </a:prstGeom>
+          <a:noFill/>
+        </p:spPr>
+        <p:txBody>
+          <a:bodyPr wrap="square" rtlCol="0">
+            <a:spAutoFit/>
+          </a:bodyPr>
+          <a:lstStyle/>
+          <a:p>
+            <a:pPr marL="285750" indent="-285750">
+              <a:buFont typeface="Arial" panose="020B0604020202020204" pitchFamily="34" charset="0"/>
+              <a:buChar char="•"/>
+            </a:pPr>
+            <a:r>
+              <a:rPr lang="en-US"/>
+              <a:t>Use side streams when a mixed product is desired.</a:t>
+            </a:r>
+          </a:p>
+          <a:p>
+            <a:pPr marL="285750" indent="-285750">
+              <a:buFont typeface="Arial" panose="020B0604020202020204" pitchFamily="34" charset="0"/>
+              <a:buChar char="•"/>
+            </a:pPr>
+            <a:r>
+              <a:rPr lang="en-US"/>
+              <a:t>Use a stripping column when the light components are very dilute and need not be purified.</a:t>
+            </a:r>
+          </a:p>
+          <a:p>
+            <a:pPr marL="285750" indent="-285750">
+              <a:buFont typeface="Arial" panose="020B0604020202020204" pitchFamily="34" charset="0"/>
+              <a:buChar char="•"/>
+            </a:pPr>
+            <a:r>
+              <a:rPr lang="en-US"/>
+              <a:t>Use a rectifying column when the heavy components are dilute and need not be purified.</a:t>
+            </a:r>
+          </a:p>
+          <a:p>
+            <a:pPr marL="285750" indent="-285750">
+              <a:buFont typeface="Arial" panose="020B0604020202020204" pitchFamily="34" charset="0"/>
+              <a:buChar char="•"/>
+            </a:pPr>
+            <a:endParaRPr lang="en-US"/>
+          </a:p>
+        </p:txBody>
+      </p:sp>
+    </p:spTree>
+    <p:extLst>
+      <p:ext uri="{BB962C8B-B14F-4D97-AF65-F5344CB8AC3E}">
+        <p14:creationId xmlns:p14="http://schemas.microsoft.com/office/powerpoint/2010/main" val="1141272271"/>
+      </p:ext>
+    </p:extLst>
+  </p:cSld>
+  <p:clrMapOvr>
+    <a:masterClrMapping/>
+  </p:clrMapOvr>
+</p:sld>
+</file>
+
+<file path=ppt/slides/slide19.xml><?xml version="1.0" encoding="utf-8"?>
+<p:sld xmlns:a="http://schemas.openxmlformats.org/drawingml/2006/main" xmlns:r="http://schemas.openxmlformats.org/officeDocument/2006/relationships" xmlns:p="http://schemas.openxmlformats.org/presentationml/2006/main">
+  <p:cSld>
+    <p:spTree>
+      <p:nvGrpSpPr>
+        <p:cNvPr id="1" name=""/>
+        <p:cNvGrpSpPr/>
+        <p:nvPr/>
+      </p:nvGrpSpPr>
+      <p:grpSpPr>
+        <a:xfrm>
+          <a:off x="0" y="0"/>
+          <a:ext cx="0" cy="0"/>
+          <a:chOff x="0" y="0"/>
+          <a:chExt cx="0" cy="0"/>
+        </a:xfrm>
+      </p:grpSpPr>
+      <p:sp>
+        <p:nvSpPr>
+          <p:cNvPr id="2" name="Title 1">
+            <a:extLst>
+              <a:ext uri="{FF2B5EF4-FFF2-40B4-BE49-F238E27FC236}">
+                <a16:creationId xmlns:a16="http://schemas.microsoft.com/office/drawing/2014/main" id="{2828DFE0-B344-4039-BC02-FAA228C857B6}"/>
+              </a:ext>
+            </a:extLst>
+          </p:cNvPr>
+          <p:cNvSpPr>
+            <a:spLocks noGrp="1"/>
+          </p:cNvSpPr>
+          <p:nvPr>
+            <p:ph type="title"/>
+          </p:nvPr>
+        </p:nvSpPr>
+        <p:spPr/>
+        <p:txBody>
+          <a:bodyPr/>
+          <a:lstStyle/>
+          <a:p>
+            <a:r>
+              <a:rPr lang="en-US"/>
+              <a:t>Azeotropes</a:t>
+            </a:r>
+          </a:p>
+        </p:txBody>
+      </p:sp>
+      <p:pic>
+        <p:nvPicPr>
+          <p:cNvPr id="5" name="Picture 4" descr="A close up of a map&#10;&#10;Description automatically generated">
+            <a:extLst>
+              <a:ext uri="{FF2B5EF4-FFF2-40B4-BE49-F238E27FC236}">
+                <a16:creationId xmlns:a16="http://schemas.microsoft.com/office/drawing/2014/main" id="{6A540D37-43A9-4F36-A2D4-3C5CA0056F43}"/>
+              </a:ext>
+            </a:extLst>
+          </p:cNvPr>
+          <p:cNvPicPr>
+            <a:picLocks noChangeAspect="1"/>
+          </p:cNvPicPr>
+          <p:nvPr/>
+        </p:nvPicPr>
+        <p:blipFill rotWithShape="1">
+          <a:blip r:embed="rId2">
+            <a:extLst>
+              <a:ext uri="{28A0092B-C50C-407E-A947-70E740481C1C}">
+                <a14:useLocalDpi xmlns:a14="http://schemas.microsoft.com/office/drawing/2010/main" val="0"/>
+              </a:ext>
+            </a:extLst>
+          </a:blip>
+          <a:srcRect r="59293" b="63320"/>
+          <a:stretch/>
+        </p:blipFill>
+        <p:spPr>
+          <a:xfrm>
+            <a:off x="123246" y="877029"/>
+            <a:ext cx="2468880" cy="2256345"/>
+          </a:xfrm>
+          <a:prstGeom prst="rect">
+            <a:avLst/>
+          </a:prstGeom>
+        </p:spPr>
+      </p:pic>
+      <p:pic>
+        <p:nvPicPr>
+          <p:cNvPr id="7" name="Picture 6" descr="A close up of a map&#10;&#10;Description automatically generated">
+            <a:extLst>
+              <a:ext uri="{FF2B5EF4-FFF2-40B4-BE49-F238E27FC236}">
+                <a16:creationId xmlns:a16="http://schemas.microsoft.com/office/drawing/2014/main" id="{353C4CC4-A588-4328-A792-4504BD932F12}"/>
+              </a:ext>
+            </a:extLst>
+          </p:cNvPr>
+          <p:cNvPicPr>
+            <a:picLocks noChangeAspect="1"/>
+          </p:cNvPicPr>
+          <p:nvPr/>
+        </p:nvPicPr>
+        <p:blipFill rotWithShape="1">
+          <a:blip r:embed="rId3">
+            <a:extLst>
+              <a:ext uri="{28A0092B-C50C-407E-A947-70E740481C1C}">
+                <a14:useLocalDpi xmlns:a14="http://schemas.microsoft.com/office/drawing/2010/main" val="0"/>
+              </a:ext>
+            </a:extLst>
+          </a:blip>
+          <a:srcRect l="5416" t="3171" r="57761" b="64664"/>
+          <a:stretch/>
+        </p:blipFill>
+        <p:spPr>
+          <a:xfrm>
+            <a:off x="209269" y="3201092"/>
+            <a:ext cx="2296834" cy="2205828"/>
+          </a:xfrm>
+          <a:prstGeom prst="rect">
+            <a:avLst/>
+          </a:prstGeom>
+        </p:spPr>
+      </p:pic>
+      <p:pic>
+        <p:nvPicPr>
+          <p:cNvPr id="8" name="Picture 7" descr="A close up of a map&#10;&#10;Description automatically generated">
+            <a:extLst>
+              <a:ext uri="{FF2B5EF4-FFF2-40B4-BE49-F238E27FC236}">
+                <a16:creationId xmlns:a16="http://schemas.microsoft.com/office/drawing/2014/main" id="{1F9A4277-4E71-4750-A6BD-5F39B0DDF58B}"/>
+              </a:ext>
+            </a:extLst>
+          </p:cNvPr>
+          <p:cNvPicPr>
+            <a:picLocks noChangeAspect="1"/>
+          </p:cNvPicPr>
+          <p:nvPr/>
+        </p:nvPicPr>
+        <p:blipFill rotWithShape="1">
+          <a:blip r:embed="rId2">
+            <a:extLst>
+              <a:ext uri="{28A0092B-C50C-407E-A947-70E740481C1C}">
+                <a14:useLocalDpi xmlns:a14="http://schemas.microsoft.com/office/drawing/2010/main" val="0"/>
+              </a:ext>
+            </a:extLst>
+          </a:blip>
+          <a:srcRect l="45016" r="4801" b="63320"/>
+          <a:stretch/>
+        </p:blipFill>
+        <p:spPr>
+          <a:xfrm>
+            <a:off x="2912211" y="1121488"/>
+            <a:ext cx="2468880" cy="1830263"/>
+          </a:xfrm>
+          <a:prstGeom prst="rect">
+            <a:avLst/>
+          </a:prstGeom>
+        </p:spPr>
+      </p:pic>
+      <p:pic>
+        <p:nvPicPr>
+          <p:cNvPr id="9" name="Picture 8" descr="A close up of a map&#10;&#10;Description automatically generated">
+            <a:extLst>
+              <a:ext uri="{FF2B5EF4-FFF2-40B4-BE49-F238E27FC236}">
+                <a16:creationId xmlns:a16="http://schemas.microsoft.com/office/drawing/2014/main" id="{4C85ADED-2749-409C-B1AF-7CFCF267195E}"/>
+              </a:ext>
+            </a:extLst>
+          </p:cNvPr>
+          <p:cNvPicPr>
+            <a:picLocks noChangeAspect="1"/>
+          </p:cNvPicPr>
+          <p:nvPr/>
+        </p:nvPicPr>
+        <p:blipFill rotWithShape="1">
+          <a:blip r:embed="rId3">
+            <a:extLst>
+              <a:ext uri="{28A0092B-C50C-407E-A947-70E740481C1C}">
+                <a14:useLocalDpi xmlns:a14="http://schemas.microsoft.com/office/drawing/2010/main" val="0"/>
+              </a:ext>
+            </a:extLst>
+          </a:blip>
+          <a:srcRect l="6254" t="38553" r="47821" b="30672"/>
+          <a:stretch/>
+        </p:blipFill>
+        <p:spPr>
+          <a:xfrm>
+            <a:off x="2775051" y="3293462"/>
+            <a:ext cx="2743200" cy="2021087"/>
+          </a:xfrm>
+          <a:prstGeom prst="rect">
+            <a:avLst/>
+          </a:prstGeom>
+        </p:spPr>
+      </p:pic>
+      <p:pic>
+        <p:nvPicPr>
+          <p:cNvPr id="10" name="Picture 9" descr="A close up of a map&#10;&#10;Description automatically generated">
+            <a:extLst>
+              <a:ext uri="{FF2B5EF4-FFF2-40B4-BE49-F238E27FC236}">
+                <a16:creationId xmlns:a16="http://schemas.microsoft.com/office/drawing/2014/main" id="{84876304-F302-45DB-9B0A-F075462FC01A}"/>
+              </a:ext>
+            </a:extLst>
+          </p:cNvPr>
+          <p:cNvPicPr>
+            <a:picLocks noChangeAspect="1"/>
+          </p:cNvPicPr>
+          <p:nvPr/>
+        </p:nvPicPr>
+        <p:blipFill rotWithShape="1">
+          <a:blip r:embed="rId2">
+            <a:extLst>
+              <a:ext uri="{28A0092B-C50C-407E-A947-70E740481C1C}">
+                <a14:useLocalDpi xmlns:a14="http://schemas.microsoft.com/office/drawing/2010/main" val="0"/>
+              </a:ext>
+            </a:extLst>
+          </a:blip>
+          <a:srcRect l="16536" t="36220" r="24917" b="29282"/>
+          <a:stretch/>
+        </p:blipFill>
+        <p:spPr>
+          <a:xfrm>
+            <a:off x="5701176" y="1121489"/>
+            <a:ext cx="2880360" cy="1721386"/>
+          </a:xfrm>
+          <a:prstGeom prst="rect">
+            <a:avLst/>
+          </a:prstGeom>
+        </p:spPr>
+      </p:pic>
+      <p:pic>
+        <p:nvPicPr>
+          <p:cNvPr id="11" name="Picture 10" descr="A close up of a map&#10;&#10;Description automatically generated">
+            <a:extLst>
+              <a:ext uri="{FF2B5EF4-FFF2-40B4-BE49-F238E27FC236}">
+                <a16:creationId xmlns:a16="http://schemas.microsoft.com/office/drawing/2014/main" id="{4E572A3B-4D7E-4443-9547-745DEDE04CBA}"/>
+              </a:ext>
+            </a:extLst>
+          </p:cNvPr>
+          <p:cNvPicPr>
+            <a:picLocks noChangeAspect="1"/>
+          </p:cNvPicPr>
+          <p:nvPr/>
+        </p:nvPicPr>
+        <p:blipFill rotWithShape="1">
+          <a:blip r:embed="rId3">
+            <a:extLst>
+              <a:ext uri="{28A0092B-C50C-407E-A947-70E740481C1C}">
+                <a14:useLocalDpi xmlns:a14="http://schemas.microsoft.com/office/drawing/2010/main" val="0"/>
+              </a:ext>
+            </a:extLst>
+          </a:blip>
+          <a:srcRect l="61218" t="3250" r="4232" b="65796"/>
+          <a:stretch/>
+        </p:blipFill>
+        <p:spPr>
+          <a:xfrm>
+            <a:off x="7080273" y="3516397"/>
+            <a:ext cx="2063727" cy="2032808"/>
+          </a:xfrm>
+          <a:prstGeom prst="rect">
+            <a:avLst/>
+          </a:prstGeom>
+        </p:spPr>
+      </p:pic>
+      <p:pic>
+        <p:nvPicPr>
+          <p:cNvPr id="12" name="Picture 11" descr="A close up of a map&#10;&#10;Description automatically generated">
+            <a:extLst>
+              <a:ext uri="{FF2B5EF4-FFF2-40B4-BE49-F238E27FC236}">
+                <a16:creationId xmlns:a16="http://schemas.microsoft.com/office/drawing/2014/main" id="{DFCD9139-9129-4F8B-B1F0-909086A20C04}"/>
+              </a:ext>
+            </a:extLst>
+          </p:cNvPr>
+          <p:cNvPicPr>
+            <a:picLocks noChangeAspect="1"/>
+          </p:cNvPicPr>
+          <p:nvPr/>
+        </p:nvPicPr>
+        <p:blipFill rotWithShape="1">
+          <a:blip r:embed="rId3">
+            <a:extLst>
+              <a:ext uri="{28A0092B-C50C-407E-A947-70E740481C1C}">
+                <a14:useLocalDpi xmlns:a14="http://schemas.microsoft.com/office/drawing/2010/main" val="0"/>
+              </a:ext>
+            </a:extLst>
+          </a:blip>
+          <a:srcRect l="61218" t="37685" r="4232" b="30827"/>
+          <a:stretch/>
+        </p:blipFill>
+        <p:spPr>
+          <a:xfrm>
+            <a:off x="4963353" y="3588389"/>
+            <a:ext cx="2063727" cy="2067871"/>
+          </a:xfrm>
+          <a:prstGeom prst="rect">
+            <a:avLst/>
+          </a:prstGeom>
+        </p:spPr>
+      </p:pic>
+    </p:spTree>
+    <p:extLst>
+      <p:ext uri="{BB962C8B-B14F-4D97-AF65-F5344CB8AC3E}">
+        <p14:creationId xmlns:p14="http://schemas.microsoft.com/office/powerpoint/2010/main" val="489406185"/>
+      </p:ext>
+    </p:extLst>
+  </p:cSld>
+  <p:clrMapOvr>
+    <a:masterClrMapping/>
+  </p:clrMapOvr>
+</p:sld>
+</file>
+
+<file path=ppt/slides/slide2.xml><?xml version="1.0" encoding="utf-8"?>
+<p:sld xmlns:a="http://schemas.openxmlformats.org/drawingml/2006/main" xmlns:r="http://schemas.openxmlformats.org/officeDocument/2006/relationships" xmlns:p="http://schemas.openxmlformats.org/presentationml/2006/main">
+  <p:cSld>
+    <p:spTree>
+      <p:nvGrpSpPr>
+        <p:cNvPr id="1" name=""/>
+        <p:cNvGrpSpPr/>
+        <p:nvPr/>
+      </p:nvGrpSpPr>
+      <p:grpSpPr>
+        <a:xfrm>
+          <a:off x="0" y="0"/>
+          <a:ext cx="0" cy="0"/>
+          <a:chOff x="0" y="0"/>
+          <a:chExt cx="0" cy="0"/>
+        </a:xfrm>
+      </p:grpSpPr>
+      <p:sp>
+        <p:nvSpPr>
+          <p:cNvPr id="2" name="Title 1">
+            <a:extLst>
+              <a:ext uri="{FF2B5EF4-FFF2-40B4-BE49-F238E27FC236}">
+                <a16:creationId xmlns:a16="http://schemas.microsoft.com/office/drawing/2014/main" id="{10857957-FBF3-4C44-943E-5EA8EB0F6105}"/>
+              </a:ext>
+            </a:extLst>
+          </p:cNvPr>
+          <p:cNvSpPr>
+            <a:spLocks noGrp="1"/>
+          </p:cNvSpPr>
+          <p:nvPr>
+            <p:ph type="title"/>
+          </p:nvPr>
+        </p:nvSpPr>
+        <p:spPr/>
+        <p:txBody>
+          <a:bodyPr/>
+          <a:lstStyle/>
+          <a:p>
+            <a:r>
+              <a:rPr lang="en-US"/>
+              <a:t>What you will learn</a:t>
+            </a:r>
+          </a:p>
+        </p:txBody>
+      </p:sp>
+      <p:sp>
+        <p:nvSpPr>
+          <p:cNvPr id="10" name="TextBox 9">
+            <a:extLst>
+              <a:ext uri="{FF2B5EF4-FFF2-40B4-BE49-F238E27FC236}">
+                <a16:creationId xmlns:a16="http://schemas.microsoft.com/office/drawing/2014/main" id="{3ADB12CB-97FF-4817-A327-21E3713F5A9B}"/>
+              </a:ext>
+            </a:extLst>
+          </p:cNvPr>
+          <p:cNvSpPr txBox="1"/>
+          <p:nvPr/>
+        </p:nvSpPr>
+        <p:spPr>
+          <a:xfrm>
+            <a:off x="303711" y="1205405"/>
+            <a:ext cx="6004324" cy="2585323"/>
+          </a:xfrm>
+          <a:prstGeom prst="rect">
+            <a:avLst/>
+          </a:prstGeom>
+          <a:noFill/>
+        </p:spPr>
+        <p:txBody>
+          <a:bodyPr wrap="square" rtlCol="0">
+            <a:spAutoFit/>
+          </a:bodyPr>
+          <a:lstStyle/>
+          <a:p>
+            <a:pPr marL="285750" indent="-285750">
+              <a:buFont typeface="Arial" panose="020B0604020202020204" pitchFamily="34" charset="0"/>
+              <a:buChar char="•"/>
+            </a:pPr>
+            <a:r>
+              <a:rPr lang="en-US"/>
+              <a:t>Process simulators are a key tool in the design of chemical processes.</a:t>
+            </a:r>
+          </a:p>
+          <a:p>
+            <a:pPr marL="285750" indent="-285750">
+              <a:buFont typeface="Arial" panose="020B0604020202020204" pitchFamily="34" charset="0"/>
+              <a:buChar char="•"/>
+            </a:pPr>
+            <a:r>
+              <a:rPr lang="en-US"/>
+              <a:t>All process simulators contain the same basic algorithms and require the same information, but have different user interfaces.</a:t>
+            </a:r>
+          </a:p>
+          <a:p>
+            <a:pPr marL="285750" indent="-285750">
+              <a:buFont typeface="Arial" panose="020B0604020202020204" pitchFamily="34" charset="0"/>
+              <a:buChar char="•"/>
+            </a:pPr>
+            <a:r>
+              <a:rPr lang="en-US"/>
+              <a:t>The correct choice of thermodynamics package is crucial for accurate simulations of chemical processes.</a:t>
+            </a:r>
+          </a:p>
+          <a:p>
+            <a:pPr marL="285750" indent="-285750">
+              <a:buFont typeface="Arial" panose="020B0604020202020204" pitchFamily="34" charset="0"/>
+              <a:buChar char="•"/>
+            </a:pPr>
+            <a:r>
+              <a:rPr lang="en-US"/>
+              <a:t>Simulation of highly non-ideal vapor-liquid equilibrium is supported by all process simulators.</a:t>
+            </a:r>
+          </a:p>
+        </p:txBody>
+      </p:sp>
+    </p:spTree>
+    <p:extLst>
+      <p:ext uri="{BB962C8B-B14F-4D97-AF65-F5344CB8AC3E}">
+        <p14:creationId xmlns:p14="http://schemas.microsoft.com/office/powerpoint/2010/main" val="1957867484"/>
+      </p:ext>
+    </p:extLst>
+  </p:cSld>
+  <p:clrMapOvr>
+    <a:masterClrMapping/>
+  </p:clrMapOvr>
+</p:sld>
+</file>
+
+<file path=ppt/slides/slide20.xml><?xml version="1.0" encoding="utf-8"?>
+<p:sld xmlns:a="http://schemas.openxmlformats.org/drawingml/2006/main" xmlns:r="http://schemas.openxmlformats.org/officeDocument/2006/relationships" xmlns:p="http://schemas.openxmlformats.org/presentationml/2006/main">
+  <p:cSld>
+    <p:spTree>
+      <p:nvGrpSpPr>
+        <p:cNvPr id="1" name=""/>
+        <p:cNvGrpSpPr/>
+        <p:nvPr/>
+      </p:nvGrpSpPr>
+      <p:grpSpPr>
+        <a:xfrm>
+          <a:off x="0" y="0"/>
+          <a:ext cx="0" cy="0"/>
+          <a:chOff x="0" y="0"/>
+          <a:chExt cx="0" cy="0"/>
+        </a:xfrm>
+      </p:grpSpPr>
+      <p:sp>
+        <p:nvSpPr>
+          <p:cNvPr id="2" name="Title 1">
+            <a:extLst>
+              <a:ext uri="{FF2B5EF4-FFF2-40B4-BE49-F238E27FC236}">
+                <a16:creationId xmlns:a16="http://schemas.microsoft.com/office/drawing/2014/main" id="{E75BED42-B1CA-4FED-BFB8-FD2258A9FA9A}"/>
+              </a:ext>
+            </a:extLst>
+          </p:cNvPr>
+          <p:cNvSpPr>
+            <a:spLocks noGrp="1"/>
+          </p:cNvSpPr>
+          <p:nvPr>
+            <p:ph type="title"/>
+          </p:nvPr>
+        </p:nvSpPr>
+        <p:spPr/>
+        <p:txBody>
+          <a:bodyPr/>
+          <a:lstStyle/>
+          <a:p>
+            <a:r>
+              <a:rPr lang="en-US"/>
+              <a:t>Separations for the HDA Process</a:t>
+            </a:r>
+          </a:p>
+        </p:txBody>
+      </p:sp>
+      <p:pic>
+        <p:nvPicPr>
+          <p:cNvPr id="5" name="Picture 4" descr="A picture containing text, map&#10;&#10;Description automatically generated">
+            <a:extLst>
+              <a:ext uri="{FF2B5EF4-FFF2-40B4-BE49-F238E27FC236}">
+                <a16:creationId xmlns:a16="http://schemas.microsoft.com/office/drawing/2014/main" id="{EB2BCE3E-C949-48D9-9154-98696AD49477}"/>
+              </a:ext>
+            </a:extLst>
+          </p:cNvPr>
+          <p:cNvPicPr>
+            <a:picLocks noChangeAspect="1"/>
+          </p:cNvPicPr>
+          <p:nvPr/>
+        </p:nvPicPr>
+        <p:blipFill rotWithShape="1">
+          <a:blip r:embed="rId2">
+            <a:extLst>
+              <a:ext uri="{28A0092B-C50C-407E-A947-70E740481C1C}">
+                <a14:useLocalDpi xmlns:a14="http://schemas.microsoft.com/office/drawing/2010/main" val="0"/>
+              </a:ext>
+            </a:extLst>
+          </a:blip>
+          <a:srcRect l="6274" t="21928" r="7598" b="9952"/>
+          <a:stretch/>
+        </p:blipFill>
+        <p:spPr>
+          <a:xfrm>
+            <a:off x="897067" y="819059"/>
+            <a:ext cx="6855625" cy="4206240"/>
+          </a:xfrm>
+          <a:prstGeom prst="rect">
+            <a:avLst/>
+          </a:prstGeom>
+        </p:spPr>
+      </p:pic>
+      <p:pic>
+        <p:nvPicPr>
+          <p:cNvPr id="7" name="Picture 6" descr="A close up of a piece of paper&#10;&#10;Description automatically generated">
+            <a:extLst>
+              <a:ext uri="{FF2B5EF4-FFF2-40B4-BE49-F238E27FC236}">
+                <a16:creationId xmlns:a16="http://schemas.microsoft.com/office/drawing/2014/main" id="{B49D7C8F-B94D-4FB9-8B6F-686685704564}"/>
+              </a:ext>
+            </a:extLst>
+          </p:cNvPr>
+          <p:cNvPicPr>
+            <a:picLocks noChangeAspect="1"/>
+          </p:cNvPicPr>
+          <p:nvPr/>
+        </p:nvPicPr>
+        <p:blipFill>
+          <a:blip r:embed="rId3">
+            <a:clrChange>
+              <a:clrFrom>
+                <a:srgbClr val="BFBFBF"/>
+              </a:clrFrom>
+              <a:clrTo>
+                <a:srgbClr val="BFBFBF">
+                  <a:alpha val="0"/>
+                </a:srgbClr>
+              </a:clrTo>
+            </a:clrChange>
+            <a:extLst>
+              <a:ext uri="{28A0092B-C50C-407E-A947-70E740481C1C}">
+                <a14:useLocalDpi xmlns:a14="http://schemas.microsoft.com/office/drawing/2010/main" val="0"/>
+              </a:ext>
+            </a:extLst>
+          </a:blip>
+          <a:stretch>
+            <a:fillRect/>
+          </a:stretch>
+        </p:blipFill>
+        <p:spPr>
+          <a:xfrm>
+            <a:off x="0" y="4851055"/>
+            <a:ext cx="9144000" cy="2006945"/>
+          </a:xfrm>
+          <a:prstGeom prst="rect">
+            <a:avLst/>
+          </a:prstGeom>
+        </p:spPr>
+      </p:pic>
+    </p:spTree>
+    <p:extLst>
+      <p:ext uri="{BB962C8B-B14F-4D97-AF65-F5344CB8AC3E}">
+        <p14:creationId xmlns:p14="http://schemas.microsoft.com/office/powerpoint/2010/main" val="1673484135"/>
+      </p:ext>
+    </p:extLst>
+  </p:cSld>
+  <p:clrMapOvr>
+    <a:masterClrMapping/>
+  </p:clrMapOvr>
+</p:sld>
+</file>
+
+<file path=ppt/slides/slide21.xml><?xml version="1.0" encoding="utf-8"?>
+<p:sld xmlns:a="http://schemas.openxmlformats.org/drawingml/2006/main" xmlns:r="http://schemas.openxmlformats.org/officeDocument/2006/relationships" xmlns:p="http://schemas.openxmlformats.org/presentationml/2006/main">
+  <p:cSld>
+    <p:spTree>
+      <p:nvGrpSpPr>
+        <p:cNvPr id="1" name=""/>
+        <p:cNvGrpSpPr/>
+        <p:nvPr/>
+      </p:nvGrpSpPr>
+      <p:grpSpPr>
+        <a:xfrm>
+          <a:off x="0" y="0"/>
+          <a:ext cx="0" cy="0"/>
+          <a:chOff x="0" y="0"/>
+          <a:chExt cx="0" cy="0"/>
+        </a:xfrm>
+      </p:grpSpPr>
+      <p:sp>
+        <p:nvSpPr>
+          <p:cNvPr id="2" name="Title 1">
+            <a:extLst>
+              <a:ext uri="{FF2B5EF4-FFF2-40B4-BE49-F238E27FC236}">
+                <a16:creationId xmlns:a16="http://schemas.microsoft.com/office/drawing/2014/main" id="{8D6B3EAB-40DE-4578-8000-D745A55DE45F}"/>
+              </a:ext>
+            </a:extLst>
+          </p:cNvPr>
+          <p:cNvSpPr>
+            <a:spLocks noGrp="1"/>
+          </p:cNvSpPr>
+          <p:nvPr>
+            <p:ph type="title"/>
+          </p:nvPr>
+        </p:nvSpPr>
+        <p:spPr/>
+        <p:txBody>
+          <a:bodyPr/>
+          <a:lstStyle/>
+          <a:p>
+            <a:r>
+              <a:rPr lang="en-US"/>
+              <a:t>Additional Heuristics</a:t>
+            </a:r>
+          </a:p>
+        </p:txBody>
+      </p:sp>
+      <p:pic>
+        <p:nvPicPr>
+          <p:cNvPr id="5" name="Picture 4" descr="A screenshot of text&#10;&#10;Description automatically generated">
+            <a:extLst>
+              <a:ext uri="{FF2B5EF4-FFF2-40B4-BE49-F238E27FC236}">
+                <a16:creationId xmlns:a16="http://schemas.microsoft.com/office/drawing/2014/main" id="{07E716E3-52D3-4B47-BC48-576C86FF2217}"/>
+              </a:ext>
+            </a:extLst>
+          </p:cNvPr>
+          <p:cNvPicPr>
+            <a:picLocks noChangeAspect="1"/>
+          </p:cNvPicPr>
+          <p:nvPr/>
+        </p:nvPicPr>
+        <p:blipFill rotWithShape="1">
+          <a:blip r:embed="rId2">
+            <a:extLst>
+              <a:ext uri="{28A0092B-C50C-407E-A947-70E740481C1C}">
+                <a14:useLocalDpi xmlns:a14="http://schemas.microsoft.com/office/drawing/2010/main" val="0"/>
+              </a:ext>
+            </a:extLst>
+          </a:blip>
+          <a:srcRect l="4731" r="2408" b="30033"/>
+          <a:stretch/>
+        </p:blipFill>
+        <p:spPr>
+          <a:xfrm>
+            <a:off x="173346" y="886309"/>
+            <a:ext cx="3657600" cy="2597726"/>
+          </a:xfrm>
+          <a:prstGeom prst="rect">
+            <a:avLst/>
+          </a:prstGeom>
+        </p:spPr>
+      </p:pic>
+      <p:pic>
+        <p:nvPicPr>
+          <p:cNvPr id="7" name="Picture 6" descr="A close up of text on a black background&#10;&#10;Description automatically generated">
+            <a:extLst>
+              <a:ext uri="{FF2B5EF4-FFF2-40B4-BE49-F238E27FC236}">
+                <a16:creationId xmlns:a16="http://schemas.microsoft.com/office/drawing/2014/main" id="{AF63875D-9A2A-4050-B9FC-18259EE2FB2A}"/>
+              </a:ext>
+            </a:extLst>
+          </p:cNvPr>
+          <p:cNvPicPr>
+            <a:picLocks noChangeAspect="1"/>
+          </p:cNvPicPr>
+          <p:nvPr/>
+        </p:nvPicPr>
+        <p:blipFill rotWithShape="1">
+          <a:blip r:embed="rId3">
+            <a:extLst>
+              <a:ext uri="{28A0092B-C50C-407E-A947-70E740481C1C}">
+                <a14:useLocalDpi xmlns:a14="http://schemas.microsoft.com/office/drawing/2010/main" val="0"/>
+              </a:ext>
+            </a:extLst>
+          </a:blip>
+          <a:srcRect l="1135" r="2053" b="28172"/>
+          <a:stretch/>
+        </p:blipFill>
+        <p:spPr>
+          <a:xfrm>
+            <a:off x="464567" y="3626065"/>
+            <a:ext cx="3291840" cy="2955545"/>
+          </a:xfrm>
+          <a:prstGeom prst="rect">
+            <a:avLst/>
+          </a:prstGeom>
+        </p:spPr>
+      </p:pic>
+      <p:pic>
+        <p:nvPicPr>
+          <p:cNvPr id="9" name="Picture 8" descr="A close up of text on a black background&#10;&#10;Description automatically generated">
+            <a:extLst>
+              <a:ext uri="{FF2B5EF4-FFF2-40B4-BE49-F238E27FC236}">
+                <a16:creationId xmlns:a16="http://schemas.microsoft.com/office/drawing/2014/main" id="{5E608C07-3F79-4B13-9038-558B8C395F63}"/>
+              </a:ext>
+            </a:extLst>
+          </p:cNvPr>
+          <p:cNvPicPr>
+            <a:picLocks noChangeAspect="1"/>
+          </p:cNvPicPr>
+          <p:nvPr/>
+        </p:nvPicPr>
+        <p:blipFill rotWithShape="1">
+          <a:blip r:embed="rId4">
+            <a:extLst>
+              <a:ext uri="{28A0092B-C50C-407E-A947-70E740481C1C}">
+                <a14:useLocalDpi xmlns:a14="http://schemas.microsoft.com/office/drawing/2010/main" val="0"/>
+              </a:ext>
+            </a:extLst>
+          </a:blip>
+          <a:srcRect l="3097" r="1815" b="21574"/>
+          <a:stretch/>
+        </p:blipFill>
+        <p:spPr>
+          <a:xfrm>
+            <a:off x="4647841" y="818151"/>
+            <a:ext cx="3657600" cy="3827521"/>
+          </a:xfrm>
+          <a:prstGeom prst="rect">
+            <a:avLst/>
+          </a:prstGeom>
+        </p:spPr>
+      </p:pic>
+      <p:pic>
+        <p:nvPicPr>
+          <p:cNvPr id="11" name="Picture 10" descr="A close up of text on a white background&#10;&#10;Description automatically generated">
+            <a:extLst>
+              <a:ext uri="{FF2B5EF4-FFF2-40B4-BE49-F238E27FC236}">
+                <a16:creationId xmlns:a16="http://schemas.microsoft.com/office/drawing/2014/main" id="{63E722BE-A7A7-40AD-A82E-67C21DBB611B}"/>
+              </a:ext>
+            </a:extLst>
+          </p:cNvPr>
+          <p:cNvPicPr>
+            <a:picLocks noChangeAspect="1"/>
+          </p:cNvPicPr>
+          <p:nvPr/>
+        </p:nvPicPr>
+        <p:blipFill rotWithShape="1">
+          <a:blip r:embed="rId5">
+            <a:extLst>
+              <a:ext uri="{28A0092B-C50C-407E-A947-70E740481C1C}">
+                <a14:useLocalDpi xmlns:a14="http://schemas.microsoft.com/office/drawing/2010/main" val="0"/>
+              </a:ext>
+            </a:extLst>
+          </a:blip>
+          <a:srcRect l="3839" t="1" r="3744" b="40602"/>
+          <a:stretch/>
+        </p:blipFill>
+        <p:spPr>
+          <a:xfrm>
+            <a:off x="4647841" y="4780600"/>
+            <a:ext cx="3657600" cy="1751644"/>
+          </a:xfrm>
+          <a:prstGeom prst="rect">
+            <a:avLst/>
+          </a:prstGeom>
+        </p:spPr>
+      </p:pic>
+    </p:spTree>
+    <p:extLst>
+      <p:ext uri="{BB962C8B-B14F-4D97-AF65-F5344CB8AC3E}">
+        <p14:creationId xmlns:p14="http://schemas.microsoft.com/office/powerpoint/2010/main" val="1653418848"/>
+      </p:ext>
+    </p:extLst>
+  </p:cSld>
+  <p:clrMapOvr>
+    <a:masterClrMapping/>
+  </p:clrMapOvr>
+</p:sld>
+</file>
+
+<file path=ppt/slides/slide22.xml><?xml version="1.0" encoding="utf-8"?>
+<p:sld xmlns:a="http://schemas.openxmlformats.org/drawingml/2006/main" xmlns:r="http://schemas.openxmlformats.org/officeDocument/2006/relationships" xmlns:p="http://schemas.openxmlformats.org/presentationml/2006/main">
+  <p:cSld>
+    <p:spTree>
+      <p:nvGrpSpPr>
+        <p:cNvPr id="1" name=""/>
+        <p:cNvGrpSpPr/>
+        <p:nvPr/>
+      </p:nvGrpSpPr>
+      <p:grpSpPr>
+        <a:xfrm>
+          <a:off x="0" y="0"/>
+          <a:ext cx="0" cy="0"/>
+          <a:chOff x="0" y="0"/>
+          <a:chExt cx="0" cy="0"/>
+        </a:xfrm>
+      </p:grpSpPr>
+      <p:sp>
+        <p:nvSpPr>
+          <p:cNvPr id="2" name="Title 1">
+            <a:extLst>
+              <a:ext uri="{FF2B5EF4-FFF2-40B4-BE49-F238E27FC236}">
+                <a16:creationId xmlns:a16="http://schemas.microsoft.com/office/drawing/2014/main" id="{8A1A5676-07A6-4D68-A40B-84378C80F9A3}"/>
+              </a:ext>
+            </a:extLst>
+          </p:cNvPr>
+          <p:cNvSpPr>
+            <a:spLocks noGrp="1"/>
+          </p:cNvSpPr>
+          <p:nvPr>
+            <p:ph type="title"/>
+          </p:nvPr>
+        </p:nvSpPr>
+        <p:spPr/>
+        <p:txBody>
+          <a:bodyPr/>
+          <a:lstStyle/>
+          <a:p>
+            <a:r>
+              <a:rPr lang="en-US"/>
+              <a:t>Additional Heuristics</a:t>
+            </a:r>
+          </a:p>
+        </p:txBody>
+      </p:sp>
+      <p:sp>
+        <p:nvSpPr>
+          <p:cNvPr id="3" name="Content Placeholder 2">
+            <a:extLst>
+              <a:ext uri="{FF2B5EF4-FFF2-40B4-BE49-F238E27FC236}">
+                <a16:creationId xmlns:a16="http://schemas.microsoft.com/office/drawing/2014/main" id="{7DE38775-71F4-4534-9E5A-AAA9F8602686}"/>
+              </a:ext>
+            </a:extLst>
+          </p:cNvPr>
+          <p:cNvSpPr>
+            <a:spLocks noGrp="1"/>
+          </p:cNvSpPr>
+          <p:nvPr>
+            <p:ph idx="1"/>
+          </p:nvPr>
+        </p:nvSpPr>
+        <p:spPr>
+          <a:xfrm>
+            <a:off x="56608" y="816175"/>
+            <a:ext cx="3817674" cy="2009363"/>
+          </a:xfrm>
+        </p:spPr>
+        <p:txBody>
+          <a:bodyPr>
+            <a:normAutofit/>
+          </a:bodyPr>
+          <a:lstStyle/>
+          <a:p>
+            <a:r>
+              <a:rPr lang="en-US" sz="2000"/>
+              <a:t>Use the design heuristics from C11 to size the following pieces of equipment:</a:t>
+            </a:r>
+          </a:p>
+          <a:p>
+            <a:pPr lvl="1"/>
+            <a:r>
+              <a:rPr lang="en-US"/>
+              <a:t>V-102</a:t>
+            </a:r>
+          </a:p>
+          <a:p>
+            <a:pPr lvl="1"/>
+            <a:r>
+              <a:rPr lang="en-US"/>
+              <a:t>E-105</a:t>
+            </a:r>
+          </a:p>
+          <a:p>
+            <a:pPr lvl="1"/>
+            <a:r>
+              <a:rPr lang="en-US"/>
+              <a:t>T-101</a:t>
+            </a:r>
+          </a:p>
+        </p:txBody>
+      </p:sp>
+      <p:pic>
+        <p:nvPicPr>
+          <p:cNvPr id="4" name="Picture 3" descr="A picture containing text, map&#10;&#10;Description automatically generated">
+            <a:extLst>
+              <a:ext uri="{FF2B5EF4-FFF2-40B4-BE49-F238E27FC236}">
+                <a16:creationId xmlns:a16="http://schemas.microsoft.com/office/drawing/2014/main" id="{EE5CCCF4-9469-4551-813B-DE4C3FF50B55}"/>
+              </a:ext>
+            </a:extLst>
+          </p:cNvPr>
+          <p:cNvPicPr>
+            <a:picLocks noChangeAspect="1"/>
+          </p:cNvPicPr>
+          <p:nvPr/>
+        </p:nvPicPr>
+        <p:blipFill rotWithShape="1">
+          <a:blip r:embed="rId2">
+            <a:extLst>
+              <a:ext uri="{28A0092B-C50C-407E-A947-70E740481C1C}">
+                <a14:useLocalDpi xmlns:a14="http://schemas.microsoft.com/office/drawing/2010/main" val="0"/>
+              </a:ext>
+            </a:extLst>
+          </a:blip>
+          <a:srcRect l="6274" t="21928" r="7598" b="9952"/>
+          <a:stretch/>
+        </p:blipFill>
+        <p:spPr>
+          <a:xfrm>
+            <a:off x="1742129" y="2548185"/>
+            <a:ext cx="6855625" cy="4206240"/>
+          </a:xfrm>
+          <a:prstGeom prst="rect">
+            <a:avLst/>
+          </a:prstGeom>
+        </p:spPr>
+      </p:pic>
+    </p:spTree>
+    <p:extLst>
+      <p:ext uri="{BB962C8B-B14F-4D97-AF65-F5344CB8AC3E}">
+        <p14:creationId xmlns:p14="http://schemas.microsoft.com/office/powerpoint/2010/main" val="3512291295"/>
+      </p:ext>
+    </p:extLst>
+  </p:cSld>
+  <p:clrMapOvr>
+    <a:masterClrMapping/>
+  </p:clrMapOvr>
+</p:sld>
+</file>
+
+<file path=ppt/slides/slide23.xml><?xml version="1.0" encoding="utf-8"?>
+<p:sld xmlns:a="http://schemas.openxmlformats.org/drawingml/2006/main" xmlns:r="http://schemas.openxmlformats.org/officeDocument/2006/relationships" xmlns:p="http://schemas.openxmlformats.org/presentationml/2006/main">
+  <p:cSld>
+    <p:spTree>
+      <p:nvGrpSpPr>
+        <p:cNvPr id="1" name=""/>
+        <p:cNvGrpSpPr/>
+        <p:nvPr/>
+      </p:nvGrpSpPr>
+      <p:grpSpPr>
+        <a:xfrm>
+          <a:off x="0" y="0"/>
+          <a:ext cx="0" cy="0"/>
+          <a:chOff x="0" y="0"/>
+          <a:chExt cx="0" cy="0"/>
+        </a:xfrm>
+      </p:grpSpPr>
+      <p:sp>
+        <p:nvSpPr>
+          <p:cNvPr id="2" name="Title 1">
+            <a:extLst>
+              <a:ext uri="{FF2B5EF4-FFF2-40B4-BE49-F238E27FC236}">
+                <a16:creationId xmlns:a16="http://schemas.microsoft.com/office/drawing/2014/main" id="{8A1A5676-07A6-4D68-A40B-84378C80F9A3}"/>
+              </a:ext>
+            </a:extLst>
+          </p:cNvPr>
+          <p:cNvSpPr>
+            <a:spLocks noGrp="1"/>
+          </p:cNvSpPr>
+          <p:nvPr>
+            <p:ph type="title"/>
+          </p:nvPr>
+        </p:nvSpPr>
+        <p:spPr/>
+        <p:txBody>
+          <a:bodyPr/>
+          <a:lstStyle/>
+          <a:p>
+            <a:r>
+              <a:rPr lang="en-US"/>
+              <a:t>Additional Heuristics</a:t>
+            </a:r>
+          </a:p>
+        </p:txBody>
+      </p:sp>
+      <p:sp>
+        <p:nvSpPr>
+          <p:cNvPr id="3" name="Content Placeholder 2">
+            <a:extLst>
+              <a:ext uri="{FF2B5EF4-FFF2-40B4-BE49-F238E27FC236}">
+                <a16:creationId xmlns:a16="http://schemas.microsoft.com/office/drawing/2014/main" id="{7DE38775-71F4-4534-9E5A-AAA9F8602686}"/>
+              </a:ext>
+            </a:extLst>
+          </p:cNvPr>
+          <p:cNvSpPr>
+            <a:spLocks noGrp="1"/>
+          </p:cNvSpPr>
+          <p:nvPr>
+            <p:ph idx="1"/>
+          </p:nvPr>
+        </p:nvSpPr>
+        <p:spPr>
+          <a:xfrm>
+            <a:off x="56608" y="816175"/>
+            <a:ext cx="3817674" cy="2009363"/>
+          </a:xfrm>
+        </p:spPr>
+        <p:txBody>
+          <a:bodyPr>
+            <a:normAutofit/>
+          </a:bodyPr>
+          <a:lstStyle/>
+          <a:p>
+            <a:r>
+              <a:rPr lang="en-US" sz="2000"/>
+              <a:t>Use the design heuristics from C11 to size the following pieces of equipment:</a:t>
+            </a:r>
+          </a:p>
+          <a:p>
+            <a:pPr lvl="1"/>
+            <a:r>
+              <a:rPr lang="en-US"/>
+              <a:t>V-102</a:t>
+            </a:r>
+          </a:p>
+          <a:p>
+            <a:pPr lvl="1"/>
+            <a:r>
+              <a:rPr lang="en-US"/>
+              <a:t>E-105</a:t>
+            </a:r>
+          </a:p>
+          <a:p>
+            <a:pPr lvl="1"/>
+            <a:r>
+              <a:rPr lang="en-US"/>
+              <a:t>T-101</a:t>
+            </a:r>
+          </a:p>
+        </p:txBody>
+      </p:sp>
+      <p:pic>
+        <p:nvPicPr>
+          <p:cNvPr id="6" name="Picture 5" descr="A picture containing text, receipt&#10;&#10;Description automatically generated">
+            <a:extLst>
+              <a:ext uri="{FF2B5EF4-FFF2-40B4-BE49-F238E27FC236}">
+                <a16:creationId xmlns:a16="http://schemas.microsoft.com/office/drawing/2014/main" id="{8B6F4343-E474-4DBB-87C6-55AE3CF33B71}"/>
+              </a:ext>
+            </a:extLst>
+          </p:cNvPr>
+          <p:cNvPicPr>
+            <a:picLocks noChangeAspect="1"/>
+          </p:cNvPicPr>
+          <p:nvPr/>
+        </p:nvPicPr>
+        <p:blipFill rotWithShape="1">
+          <a:blip r:embed="rId2">
+            <a:extLst>
+              <a:ext uri="{28A0092B-C50C-407E-A947-70E740481C1C}">
+                <a14:useLocalDpi xmlns:a14="http://schemas.microsoft.com/office/drawing/2010/main" val="0"/>
+              </a:ext>
+            </a:extLst>
+          </a:blip>
+          <a:srcRect b="12922"/>
+          <a:stretch/>
+        </p:blipFill>
+        <p:spPr>
+          <a:xfrm>
+            <a:off x="4031361" y="1040077"/>
+            <a:ext cx="4305938" cy="5486400"/>
+          </a:xfrm>
+          <a:prstGeom prst="rect">
+            <a:avLst/>
+          </a:prstGeom>
+        </p:spPr>
+      </p:pic>
+    </p:spTree>
+    <p:extLst>
+      <p:ext uri="{BB962C8B-B14F-4D97-AF65-F5344CB8AC3E}">
+        <p14:creationId xmlns:p14="http://schemas.microsoft.com/office/powerpoint/2010/main" val="4191263778"/>
+      </p:ext>
+    </p:extLst>
+  </p:cSld>
+  <p:clrMapOvr>
+    <a:masterClrMapping/>
+  </p:clrMapOvr>
+</p:sld>
+</file>
+
+<file path=ppt/slides/slide3.xml><?xml version="1.0" encoding="utf-8"?>
+<p:sld xmlns:a="http://schemas.openxmlformats.org/drawingml/2006/main" xmlns:r="http://schemas.openxmlformats.org/officeDocument/2006/relationships" xmlns:p="http://schemas.openxmlformats.org/presentationml/2006/main">
+  <p:cSld>
+    <p:spTree>
+      <p:nvGrpSpPr>
+        <p:cNvPr id="1" name=""/>
+        <p:cNvGrpSpPr/>
+        <p:nvPr/>
+      </p:nvGrpSpPr>
+      <p:grpSpPr>
+        <a:xfrm>
+          <a:off x="0" y="0"/>
+          <a:ext cx="0" cy="0"/>
+          <a:chOff x="0" y="0"/>
+          <a:chExt cx="0" cy="0"/>
+        </a:xfrm>
+      </p:grpSpPr>
+      <p:sp>
+        <p:nvSpPr>
+          <p:cNvPr id="2" name="Title 1">
+            <a:extLst>
+              <a:ext uri="{FF2B5EF4-FFF2-40B4-BE49-F238E27FC236}">
+                <a16:creationId xmlns:a16="http://schemas.microsoft.com/office/drawing/2014/main" id="{773BE34D-B7F9-46A1-928B-E3954D878E86}"/>
+              </a:ext>
+            </a:extLst>
+          </p:cNvPr>
+          <p:cNvSpPr>
+            <a:spLocks noGrp="1"/>
+          </p:cNvSpPr>
+          <p:nvPr>
+            <p:ph type="title"/>
+          </p:nvPr>
+        </p:nvSpPr>
+        <p:spPr/>
+        <p:txBody>
+          <a:bodyPr/>
+          <a:lstStyle/>
+          <a:p>
+            <a:r>
+              <a:rPr lang="en-US"/>
+              <a:t>The structure of a process simulator</a:t>
+            </a:r>
+          </a:p>
+        </p:txBody>
+      </p:sp>
+      <p:pic>
+        <p:nvPicPr>
+          <p:cNvPr id="7" name="Content Placeholder 6" descr="A close up of text on a black background&#10;&#10;Description automatically generated">
+            <a:extLst>
+              <a:ext uri="{FF2B5EF4-FFF2-40B4-BE49-F238E27FC236}">
+                <a16:creationId xmlns:a16="http://schemas.microsoft.com/office/drawing/2014/main" id="{47BBC953-3AE0-41BE-BF36-04295FBF84A2}"/>
+              </a:ext>
+            </a:extLst>
+          </p:cNvPr>
+          <p:cNvPicPr>
+            <a:picLocks noGrp="1" noChangeAspect="1"/>
+          </p:cNvPicPr>
+          <p:nvPr>
+            <p:ph idx="1"/>
+          </p:nvPr>
+        </p:nvPicPr>
+        <p:blipFill rotWithShape="1">
+          <a:blip r:embed="rId2">
+            <a:extLst>
+              <a:ext uri="{28A0092B-C50C-407E-A947-70E740481C1C}">
+                <a14:useLocalDpi xmlns:a14="http://schemas.microsoft.com/office/drawing/2010/main" val="0"/>
+              </a:ext>
+            </a:extLst>
+          </a:blip>
+          <a:srcRect t="4905" r="2345" b="12352"/>
+          <a:stretch/>
+        </p:blipFill>
+        <p:spPr>
+          <a:xfrm>
+            <a:off x="1307171" y="1369431"/>
+            <a:ext cx="6250713" cy="4876066"/>
+          </a:xfrm>
+        </p:spPr>
+      </p:pic>
+    </p:spTree>
+    <p:extLst>
+      <p:ext uri="{BB962C8B-B14F-4D97-AF65-F5344CB8AC3E}">
+        <p14:creationId xmlns:p14="http://schemas.microsoft.com/office/powerpoint/2010/main" val="1563412917"/>
+      </p:ext>
+    </p:extLst>
+  </p:cSld>
+  <p:clrMapOvr>
+    <a:masterClrMapping/>
+  </p:clrMapOvr>
+</p:sld>
+</file>
+
+<file path=ppt/slides/slide4.xml><?xml version="1.0" encoding="utf-8"?>
+<p:sld xmlns:a="http://schemas.openxmlformats.org/drawingml/2006/main" xmlns:r="http://schemas.openxmlformats.org/officeDocument/2006/relationships" xmlns:p="http://schemas.openxmlformats.org/presentationml/2006/main">
+  <p:cSld>
+    <p:spTree>
+      <p:nvGrpSpPr>
+        <p:cNvPr id="1" name=""/>
+        <p:cNvGrpSpPr/>
+        <p:nvPr/>
+      </p:nvGrpSpPr>
+      <p:grpSpPr>
+        <a:xfrm>
+          <a:off x="0" y="0"/>
+          <a:ext cx="0" cy="0"/>
+          <a:chOff x="0" y="0"/>
+          <a:chExt cx="0" cy="0"/>
+        </a:xfrm>
+      </p:grpSpPr>
+      <p:sp>
+        <p:nvSpPr>
+          <p:cNvPr id="2" name="Title 1">
+            <a:extLst>
+              <a:ext uri="{FF2B5EF4-FFF2-40B4-BE49-F238E27FC236}">
+                <a16:creationId xmlns:a16="http://schemas.microsoft.com/office/drawing/2014/main" id="{D83F5C67-F42C-4DAD-BC9A-F11546056BD3}"/>
+              </a:ext>
+            </a:extLst>
+          </p:cNvPr>
+          <p:cNvSpPr>
+            <a:spLocks noGrp="1"/>
+          </p:cNvSpPr>
+          <p:nvPr>
+            <p:ph type="title"/>
+          </p:nvPr>
+        </p:nvSpPr>
+        <p:spPr/>
+        <p:txBody>
+          <a:bodyPr/>
+          <a:lstStyle/>
+          <a:p>
+            <a:r>
+              <a:rPr lang="en-US"/>
+              <a:t>Warning</a:t>
+            </a:r>
+          </a:p>
+        </p:txBody>
+      </p:sp>
+      <p:sp>
+        <p:nvSpPr>
+          <p:cNvPr id="3" name="Content Placeholder 2">
+            <a:extLst>
+              <a:ext uri="{FF2B5EF4-FFF2-40B4-BE49-F238E27FC236}">
+                <a16:creationId xmlns:a16="http://schemas.microsoft.com/office/drawing/2014/main" id="{ADD93C63-2C7E-4ABB-A3F2-CD794CA0DBB6}"/>
+              </a:ext>
+            </a:extLst>
+          </p:cNvPr>
+          <p:cNvSpPr>
+            <a:spLocks noGrp="1"/>
+          </p:cNvSpPr>
+          <p:nvPr>
+            <p:ph idx="1"/>
+          </p:nvPr>
+        </p:nvSpPr>
+        <p:spPr>
+          <a:xfrm>
+            <a:off x="706657" y="2376289"/>
+            <a:ext cx="7886700" cy="2910764"/>
+          </a:xfrm>
+        </p:spPr>
+        <p:txBody>
+          <a:bodyPr>
+            <a:normAutofit/>
+          </a:bodyPr>
+          <a:lstStyle/>
+          <a:p>
+            <a:pPr marL="0" indent="0">
+              <a:buNone/>
+            </a:pPr>
+            <a:r>
+              <a:rPr lang="en-US" sz="4800" b="1"/>
+              <a:t>You are responsible for analyzing the results from the computer.</a:t>
+            </a:r>
+          </a:p>
+        </p:txBody>
+      </p:sp>
+    </p:spTree>
+    <p:extLst>
+      <p:ext uri="{BB962C8B-B14F-4D97-AF65-F5344CB8AC3E}">
+        <p14:creationId xmlns:p14="http://schemas.microsoft.com/office/powerpoint/2010/main" val="1239296632"/>
+      </p:ext>
+    </p:extLst>
+  </p:cSld>
+  <p:clrMapOvr>
+    <a:masterClrMapping/>
+  </p:clrMapOvr>
+</p:sld>
+</file>
+
+<file path=ppt/slides/slide5.xml><?xml version="1.0" encoding="utf-8"?>
+<p:sld xmlns:a="http://schemas.openxmlformats.org/drawingml/2006/main" xmlns:r="http://schemas.openxmlformats.org/officeDocument/2006/relationships" xmlns:p="http://schemas.openxmlformats.org/presentationml/2006/main">
+  <p:cSld>
+    <p:spTree>
+      <p:nvGrpSpPr>
+        <p:cNvPr id="1" name=""/>
+        <p:cNvGrpSpPr/>
+        <p:nvPr/>
+      </p:nvGrpSpPr>
+      <p:grpSpPr>
+        <a:xfrm>
+          <a:off x="0" y="0"/>
+          <a:ext cx="0" cy="0"/>
+          <a:chOff x="0" y="0"/>
+          <a:chExt cx="0" cy="0"/>
+        </a:xfrm>
+      </p:grpSpPr>
+      <p:sp>
+        <p:nvSpPr>
+          <p:cNvPr id="2" name="Title 1">
+            <a:extLst>
+              <a:ext uri="{FF2B5EF4-FFF2-40B4-BE49-F238E27FC236}">
+                <a16:creationId xmlns:a16="http://schemas.microsoft.com/office/drawing/2014/main" id="{2EF3C909-741C-4A32-B575-2585F6190126}"/>
+              </a:ext>
+            </a:extLst>
+          </p:cNvPr>
+          <p:cNvSpPr>
+            <a:spLocks noGrp="1"/>
+          </p:cNvSpPr>
+          <p:nvPr>
+            <p:ph type="title"/>
+          </p:nvPr>
+        </p:nvSpPr>
+        <p:spPr/>
+        <p:txBody>
+          <a:bodyPr/>
+          <a:lstStyle/>
+          <a:p>
+            <a:r>
+              <a:rPr lang="en-US"/>
+              <a:t>Selection of Chemical Components</a:t>
+            </a:r>
+          </a:p>
+        </p:txBody>
+      </p:sp>
+      <p:sp>
+        <p:nvSpPr>
+          <p:cNvPr id="3" name="Content Placeholder 2">
+            <a:extLst>
+              <a:ext uri="{FF2B5EF4-FFF2-40B4-BE49-F238E27FC236}">
+                <a16:creationId xmlns:a16="http://schemas.microsoft.com/office/drawing/2014/main" id="{47F75F91-81B6-408C-8680-F313C7E4C727}"/>
+              </a:ext>
+            </a:extLst>
+          </p:cNvPr>
+          <p:cNvSpPr>
+            <a:spLocks noGrp="1"/>
+          </p:cNvSpPr>
+          <p:nvPr>
+            <p:ph idx="1"/>
+          </p:nvPr>
+        </p:nvSpPr>
+        <p:spPr/>
+        <p:txBody>
+          <a:bodyPr/>
+          <a:lstStyle/>
+          <a:p>
+            <a:endParaRPr lang="en-US"/>
+          </a:p>
+        </p:txBody>
+      </p:sp>
+    </p:spTree>
+    <p:extLst>
+      <p:ext uri="{BB962C8B-B14F-4D97-AF65-F5344CB8AC3E}">
+        <p14:creationId xmlns:p14="http://schemas.microsoft.com/office/powerpoint/2010/main" val="1538525450"/>
+      </p:ext>
+    </p:extLst>
+  </p:cSld>
+  <p:clrMapOvr>
+    <a:masterClrMapping/>
+  </p:clrMapOvr>
+</p:sld>
+</file>
+
+<file path=ppt/slides/slide6.xml><?xml version="1.0" encoding="utf-8"?>
+<p:sld xmlns:a="http://schemas.openxmlformats.org/drawingml/2006/main" xmlns:r="http://schemas.openxmlformats.org/officeDocument/2006/relationships" xmlns:p="http://schemas.openxmlformats.org/presentationml/2006/main">
+  <p:cSld>
+    <p:spTree>
+      <p:nvGrpSpPr>
+        <p:cNvPr id="1" name=""/>
+        <p:cNvGrpSpPr/>
+        <p:nvPr/>
+      </p:nvGrpSpPr>
+      <p:grpSpPr>
+        <a:xfrm>
+          <a:off x="0" y="0"/>
+          <a:ext cx="0" cy="0"/>
+          <a:chOff x="0" y="0"/>
+          <a:chExt cx="0" cy="0"/>
+        </a:xfrm>
+      </p:grpSpPr>
+      <p:sp>
+        <p:nvSpPr>
+          <p:cNvPr id="2" name="Title 1">
+            <a:extLst>
+              <a:ext uri="{FF2B5EF4-FFF2-40B4-BE49-F238E27FC236}">
+                <a16:creationId xmlns:a16="http://schemas.microsoft.com/office/drawing/2014/main" id="{9EB95629-365A-438A-B93F-72537EBDE389}"/>
+              </a:ext>
+            </a:extLst>
+          </p:cNvPr>
+          <p:cNvSpPr>
+            <a:spLocks noGrp="1"/>
+          </p:cNvSpPr>
+          <p:nvPr>
+            <p:ph type="title"/>
+          </p:nvPr>
+        </p:nvSpPr>
+        <p:spPr/>
+        <p:txBody>
+          <a:bodyPr/>
+          <a:lstStyle/>
+          <a:p>
+            <a:r>
+              <a:rPr lang="en-US"/>
+              <a:t>Selection of Physical Property Models</a:t>
+            </a:r>
+          </a:p>
+        </p:txBody>
+      </p:sp>
+      <p:sp>
+        <p:nvSpPr>
+          <p:cNvPr id="3" name="Content Placeholder 2">
+            <a:extLst>
+              <a:ext uri="{FF2B5EF4-FFF2-40B4-BE49-F238E27FC236}">
+                <a16:creationId xmlns:a16="http://schemas.microsoft.com/office/drawing/2014/main" id="{6E19A6C7-FE0B-4440-B67C-36ABC291BD0B}"/>
+              </a:ext>
+            </a:extLst>
+          </p:cNvPr>
+          <p:cNvSpPr>
+            <a:spLocks noGrp="1"/>
+          </p:cNvSpPr>
+          <p:nvPr>
+            <p:ph idx="1"/>
+          </p:nvPr>
+        </p:nvSpPr>
+        <p:spPr/>
+        <p:txBody>
+          <a:bodyPr/>
+          <a:lstStyle/>
+          <a:p>
+            <a:endParaRPr lang="en-US"/>
+          </a:p>
+        </p:txBody>
+      </p:sp>
+    </p:spTree>
+    <p:extLst>
+      <p:ext uri="{BB962C8B-B14F-4D97-AF65-F5344CB8AC3E}">
+        <p14:creationId xmlns:p14="http://schemas.microsoft.com/office/powerpoint/2010/main" val="2302470484"/>
+      </p:ext>
+    </p:extLst>
+  </p:cSld>
+  <p:clrMapOvr>
+    <a:masterClrMapping/>
+  </p:clrMapOvr>
+</p:sld>
+</file>
+
+<file path=ppt/slides/slide7.xml><?xml version="1.0" encoding="utf-8"?>
+<p:sld xmlns:a="http://schemas.openxmlformats.org/drawingml/2006/main" xmlns:r="http://schemas.openxmlformats.org/officeDocument/2006/relationships" xmlns:p="http://schemas.openxmlformats.org/presentationml/2006/main">
+  <p:cSld>
+    <p:spTree>
+      <p:nvGrpSpPr>
+        <p:cNvPr id="1" name=""/>
+        <p:cNvGrpSpPr/>
+        <p:nvPr/>
+      </p:nvGrpSpPr>
+      <p:grpSpPr>
+        <a:xfrm>
+          <a:off x="0" y="0"/>
+          <a:ext cx="0" cy="0"/>
+          <a:chOff x="0" y="0"/>
+          <a:chExt cx="0" cy="0"/>
+        </a:xfrm>
+      </p:grpSpPr>
+      <p:sp>
+        <p:nvSpPr>
+          <p:cNvPr id="2" name="Title 1">
+            <a:extLst>
+              <a:ext uri="{FF2B5EF4-FFF2-40B4-BE49-F238E27FC236}">
+                <a16:creationId xmlns:a16="http://schemas.microsoft.com/office/drawing/2014/main" id="{41AB1B9D-502D-400F-9A7C-04FBCFDC39C0}"/>
+              </a:ext>
+            </a:extLst>
+          </p:cNvPr>
+          <p:cNvSpPr>
+            <a:spLocks noGrp="1"/>
+          </p:cNvSpPr>
+          <p:nvPr>
+            <p:ph type="title"/>
+          </p:nvPr>
+        </p:nvSpPr>
+        <p:spPr/>
+        <p:txBody>
+          <a:bodyPr/>
+          <a:lstStyle/>
+          <a:p>
+            <a:r>
+              <a:rPr lang="en-US"/>
+              <a:t>Selection of Input and Flowsheet Topology</a:t>
+            </a:r>
+          </a:p>
+        </p:txBody>
+      </p:sp>
+      <p:sp>
+        <p:nvSpPr>
+          <p:cNvPr id="3" name="Content Placeholder 2">
+            <a:extLst>
+              <a:ext uri="{FF2B5EF4-FFF2-40B4-BE49-F238E27FC236}">
+                <a16:creationId xmlns:a16="http://schemas.microsoft.com/office/drawing/2014/main" id="{16A030A4-FBF4-409A-9CCD-D8C36F4833C4}"/>
+              </a:ext>
+            </a:extLst>
+          </p:cNvPr>
+          <p:cNvSpPr>
+            <a:spLocks noGrp="1"/>
+          </p:cNvSpPr>
+          <p:nvPr>
+            <p:ph idx="1"/>
+          </p:nvPr>
+        </p:nvSpPr>
+        <p:spPr/>
+        <p:txBody>
+          <a:bodyPr/>
+          <a:lstStyle/>
+          <a:p>
+            <a:endParaRPr lang="en-US"/>
+          </a:p>
+        </p:txBody>
+      </p:sp>
+    </p:spTree>
+    <p:extLst>
+      <p:ext uri="{BB962C8B-B14F-4D97-AF65-F5344CB8AC3E}">
+        <p14:creationId xmlns:p14="http://schemas.microsoft.com/office/powerpoint/2010/main" val="1309276826"/>
+      </p:ext>
+    </p:extLst>
+  </p:cSld>
+  <p:clrMapOvr>
+    <a:masterClrMapping/>
+  </p:clrMapOvr>
+</p:sld>
+</file>
+
 <file path=ppt/slides/slide8.xml><?xml version="1.0" encoding="utf-8"?>
 <p:sld xmlns:a="http://schemas.openxmlformats.org/drawingml/2006/main" xmlns:r="http://schemas.openxmlformats.org/officeDocument/2006/relationships" xmlns:p="http://schemas.openxmlformats.org/presentationml/2006/main">
   <p:cSld>
@@ -5884,7 +6662,7 @@
           <p:cNvPr id="2" name="Title 1">
             <a:extLst>
               <a:ext uri="{FF2B5EF4-FFF2-40B4-BE49-F238E27FC236}">
-                <a16:creationId xmlns:a16="http://schemas.microsoft.com/office/drawing/2014/main" id="{39D2C4B5-84BC-48B5-842C-A31C61D310BB}"/>
+                <a16:creationId xmlns:a16="http://schemas.microsoft.com/office/drawing/2014/main" id="{458848C7-10EA-438B-B727-25DDDBD0D3D7}"/>
               </a:ext>
             </a:extLst>
           </p:cNvPr>
@@ -5902,50 +6680,40 @@
           <a:p>
             <a:r>
               <a:rPr lang="en-US"/>
-              <a:t>Separation Heuristics</a:t>
-            </a:r>
-          </a:p>
-        </p:txBody>
-      </p:sp>
-      <p:pic>
-        <p:nvPicPr>
-          <p:cNvPr id="5" name="Picture 4" descr="A screenshot of text&#10;&#10;Description automatically generated">
+              <a:t>Selection of Feed Stream Properties</a:t>
+            </a:r>
+          </a:p>
+        </p:txBody>
+      </p:sp>
+      <p:sp>
+        <p:nvSpPr>
+          <p:cNvPr id="3" name="Content Placeholder 2">
             <a:extLst>
               <a:ext uri="{FF2B5EF4-FFF2-40B4-BE49-F238E27FC236}">
-                <a16:creationId xmlns:a16="http://schemas.microsoft.com/office/drawing/2014/main" id="{25D40D20-3719-4ED9-89FA-C7A0EE7EAD45}"/>
+                <a16:creationId xmlns:a16="http://schemas.microsoft.com/office/drawing/2014/main" id="{14F98665-6EC3-4D7B-9A40-89F9749AE918}"/>
               </a:ext>
             </a:extLst>
           </p:cNvPr>
-          <p:cNvPicPr>
-            <a:picLocks noChangeAspect="1"/>
-          </p:cNvPicPr>
-          <p:nvPr/>
-        </p:nvPicPr>
-        <p:blipFill rotWithShape="1">
-          <a:blip r:embed="rId2">
-            <a:extLst>
-              <a:ext uri="{28A0092B-C50C-407E-A947-70E740481C1C}">
-                <a14:useLocalDpi xmlns:a14="http://schemas.microsoft.com/office/drawing/2010/main" val="0"/>
-              </a:ext>
-            </a:extLst>
-          </a:blip>
-          <a:srcRect t="1328" b="15765"/>
-          <a:stretch/>
-        </p:blipFill>
-        <p:spPr>
-          <a:xfrm>
-            <a:off x="1249331" y="940402"/>
-            <a:ext cx="5735271" cy="5685748"/>
-          </a:xfrm>
-          <a:prstGeom prst="rect">
-            <a:avLst/>
-          </a:prstGeom>
-        </p:spPr>
-      </p:pic>
+          <p:cNvSpPr>
+            <a:spLocks noGrp="1"/>
+          </p:cNvSpPr>
+          <p:nvPr>
+            <p:ph idx="1"/>
+          </p:nvPr>
+        </p:nvSpPr>
+        <p:spPr/>
+        <p:txBody>
+          <a:bodyPr/>
+          <a:lstStyle/>
+          <a:p>
+            <a:endParaRPr lang="en-US"/>
+          </a:p>
+        </p:txBody>
+      </p:sp>
     </p:spTree>
     <p:extLst>
       <p:ext uri="{BB962C8B-B14F-4D97-AF65-F5344CB8AC3E}">
-        <p14:creationId xmlns:p14="http://schemas.microsoft.com/office/powerpoint/2010/main" val="1027139185"/>
+        <p14:creationId xmlns:p14="http://schemas.microsoft.com/office/powerpoint/2010/main" val="664419775"/>
       </p:ext>
     </p:extLst>
   </p:cSld>
@@ -5977,7 +6745,7 @@
           <p:cNvPr id="2" name="Title 1">
             <a:extLst>
               <a:ext uri="{FF2B5EF4-FFF2-40B4-BE49-F238E27FC236}">
-                <a16:creationId xmlns:a16="http://schemas.microsoft.com/office/drawing/2014/main" id="{F3549CF1-2D79-4959-85C0-A1A2F11D5AEE}"/>
+                <a16:creationId xmlns:a16="http://schemas.microsoft.com/office/drawing/2014/main" id="{BC854E29-D53F-4739-8034-3B90340AD5AF}"/>
               </a:ext>
             </a:extLst>
           </p:cNvPr>
@@ -5995,107 +6763,32 @@
           <a:p>
             <a:r>
               <a:rPr lang="en-US"/>
-              <a:t>Alternate separations units</a:t>
-            </a:r>
-          </a:p>
-        </p:txBody>
-      </p:sp>
-      <p:pic>
-        <p:nvPicPr>
-          <p:cNvPr id="8" name="Content Placeholder 7" descr="A close up of a map&#10;&#10;Description automatically generated">
+              <a:t>Selection of Equipment Parameters</a:t>
+            </a:r>
+          </a:p>
+        </p:txBody>
+      </p:sp>
+      <p:sp>
+        <p:nvSpPr>
+          <p:cNvPr id="3" name="Content Placeholder 2">
             <a:extLst>
               <a:ext uri="{FF2B5EF4-FFF2-40B4-BE49-F238E27FC236}">
-                <a16:creationId xmlns:a16="http://schemas.microsoft.com/office/drawing/2014/main" id="{BFC5E142-98E6-4FCE-92F7-64F9B5538114}"/>
+                <a16:creationId xmlns:a16="http://schemas.microsoft.com/office/drawing/2014/main" id="{8A87FD75-DFB5-4035-8249-D68E70F4C11D}"/>
               </a:ext>
             </a:extLst>
           </p:cNvPr>
-          <p:cNvPicPr>
-            <a:picLocks noGrp="1" noChangeAspect="1"/>
-          </p:cNvPicPr>
+          <p:cNvSpPr>
+            <a:spLocks noGrp="1"/>
+          </p:cNvSpPr>
           <p:nvPr>
             <p:ph idx="1"/>
           </p:nvPr>
-        </p:nvPicPr>
-        <p:blipFill rotWithShape="1">
-          <a:blip r:embed="rId2">
-            <a:extLst>
-              <a:ext uri="{28A0092B-C50C-407E-A947-70E740481C1C}">
-                <a14:useLocalDpi xmlns:a14="http://schemas.microsoft.com/office/drawing/2010/main" val="0"/>
-              </a:ext>
-            </a:extLst>
-          </a:blip>
-          <a:srcRect l="733" r="2135" b="14066"/>
-          <a:stretch/>
-        </p:blipFill>
-        <p:spPr>
-          <a:xfrm>
-            <a:off x="3293573" y="1224218"/>
-            <a:ext cx="5486400" cy="5104664"/>
-          </a:xfrm>
-        </p:spPr>
-      </p:pic>
-      <p:sp>
-        <p:nvSpPr>
-          <p:cNvPr id="9" name="TextBox 8">
-            <a:extLst>
-              <a:ext uri="{FF2B5EF4-FFF2-40B4-BE49-F238E27FC236}">
-                <a16:creationId xmlns:a16="http://schemas.microsoft.com/office/drawing/2014/main" id="{4AB7A9A9-4358-475E-B241-34B20A0D35E0}"/>
-              </a:ext>
-            </a:extLst>
-          </p:cNvPr>
-          <p:cNvSpPr txBox="1"/>
-          <p:nvPr/>
-        </p:nvSpPr>
-        <p:spPr>
-          <a:xfrm>
-            <a:off x="65005" y="1950142"/>
-            <a:ext cx="3341243" cy="3139321"/>
-          </a:xfrm>
-          <a:prstGeom prst="rect">
-            <a:avLst/>
-          </a:prstGeom>
-          <a:noFill/>
-        </p:spPr>
-        <p:txBody>
-          <a:bodyPr wrap="square" rtlCol="0">
-            <a:spAutoFit/>
-          </a:bodyPr>
-          <a:lstStyle/>
-          <a:p>
-            <a:pPr marL="285750" indent="-285750">
-              <a:buFont typeface="Arial" panose="020B0604020202020204" pitchFamily="34" charset="0"/>
-              <a:buChar char="•"/>
-            </a:pPr>
-            <a:r>
-              <a:rPr lang="en-US"/>
-              <a:t>Use side streams when a mixed product is desired.</a:t>
-            </a:r>
-          </a:p>
-          <a:p>
-            <a:pPr marL="285750" indent="-285750">
-              <a:buFont typeface="Arial" panose="020B0604020202020204" pitchFamily="34" charset="0"/>
-              <a:buChar char="•"/>
-            </a:pPr>
-            <a:r>
-              <a:rPr lang="en-US"/>
-              <a:t>Use a stripping column when the light components are very dilute and need not be purified.</a:t>
-            </a:r>
-          </a:p>
-          <a:p>
-            <a:pPr marL="285750" indent="-285750">
-              <a:buFont typeface="Arial" panose="020B0604020202020204" pitchFamily="34" charset="0"/>
-              <a:buChar char="•"/>
-            </a:pPr>
-            <a:r>
-              <a:rPr lang="en-US"/>
-              <a:t>Use a rectifying column when the heavy components are dilute and need not be purified.</a:t>
-            </a:r>
-          </a:p>
-          <a:p>
-            <a:pPr marL="285750" indent="-285750">
-              <a:buFont typeface="Arial" panose="020B0604020202020204" pitchFamily="34" charset="0"/>
-              <a:buChar char="•"/>
-            </a:pPr>
+        </p:nvSpPr>
+        <p:spPr/>
+        <p:txBody>
+          <a:bodyPr/>
+          <a:lstStyle/>
+          <a:p>
             <a:endParaRPr lang="en-US"/>
           </a:p>
         </p:txBody>
@@ -6103,7 +6796,7 @@
     </p:spTree>
     <p:extLst>
       <p:ext uri="{BB962C8B-B14F-4D97-AF65-F5344CB8AC3E}">
-        <p14:creationId xmlns:p14="http://schemas.microsoft.com/office/powerpoint/2010/main" val="1141272271"/>
+        <p14:creationId xmlns:p14="http://schemas.microsoft.com/office/powerpoint/2010/main" val="1760247277"/>
       </p:ext>
     </p:extLst>
   </p:cSld>

</xml_diff>